<commit_message>
updated ppt and R script
</commit_message>
<xml_diff>
--- a/HousingPricesPresentations-3.pptx
+++ b/HousingPricesPresentations-3.pptx
@@ -32,7 +32,7 @@
     <p:sldId id="289" r:id="rId23"/>
     <p:sldId id="278" r:id="rId24"/>
     <p:sldId id="297" r:id="rId25"/>
-    <p:sldId id="298" r:id="rId26"/>
+    <p:sldId id="306" r:id="rId26"/>
     <p:sldId id="299" r:id="rId27"/>
     <p:sldId id="300" r:id="rId28"/>
     <p:sldId id="301" r:id="rId29"/>
@@ -239,7 +239,7 @@
           <a:p>
             <a:fld id="{DB8E79D4-252B-4C95-90F9-A74A29158865}" type="datetimeFigureOut">
               <a:rPr lang="en-US" smtClean="0"/>
-              <a:t>11/12/17</a:t>
+              <a:t>11/13/2017</a:t>
             </a:fld>
             <a:endParaRPr lang="en-US"/>
           </a:p>
@@ -653,7 +653,7 @@
           <a:p>
             <a:fld id="{91C3B79F-EC10-4F20-9362-C4544C73AAEC}" type="datetimeFigureOut">
               <a:rPr lang="en-US" smtClean="0"/>
-              <a:t>11/12/17</a:t>
+              <a:t>11/13/2017</a:t>
             </a:fld>
             <a:endParaRPr lang="en-US"/>
           </a:p>
@@ -851,7 +851,7 @@
           <a:p>
             <a:fld id="{91C3B79F-EC10-4F20-9362-C4544C73AAEC}" type="datetimeFigureOut">
               <a:rPr lang="en-US" smtClean="0"/>
-              <a:t>11/12/17</a:t>
+              <a:t>11/13/2017</a:t>
             </a:fld>
             <a:endParaRPr lang="en-US"/>
           </a:p>
@@ -1059,7 +1059,7 @@
           <a:p>
             <a:fld id="{91C3B79F-EC10-4F20-9362-C4544C73AAEC}" type="datetimeFigureOut">
               <a:rPr lang="en-US" smtClean="0"/>
-              <a:t>11/12/17</a:t>
+              <a:t>11/13/2017</a:t>
             </a:fld>
             <a:endParaRPr lang="en-US"/>
           </a:p>
@@ -1257,7 +1257,7 @@
           <a:p>
             <a:fld id="{91C3B79F-EC10-4F20-9362-C4544C73AAEC}" type="datetimeFigureOut">
               <a:rPr lang="en-US" smtClean="0"/>
-              <a:t>11/12/17</a:t>
+              <a:t>11/13/2017</a:t>
             </a:fld>
             <a:endParaRPr lang="en-US"/>
           </a:p>
@@ -1532,7 +1532,7 @@
           <a:p>
             <a:fld id="{91C3B79F-EC10-4F20-9362-C4544C73AAEC}" type="datetimeFigureOut">
               <a:rPr lang="en-US" smtClean="0"/>
-              <a:t>11/12/17</a:t>
+              <a:t>11/13/2017</a:t>
             </a:fld>
             <a:endParaRPr lang="en-US"/>
           </a:p>
@@ -1797,7 +1797,7 @@
           <a:p>
             <a:fld id="{91C3B79F-EC10-4F20-9362-C4544C73AAEC}" type="datetimeFigureOut">
               <a:rPr lang="en-US" smtClean="0"/>
-              <a:t>11/12/17</a:t>
+              <a:t>11/13/2017</a:t>
             </a:fld>
             <a:endParaRPr lang="en-US"/>
           </a:p>
@@ -2209,7 +2209,7 @@
           <a:p>
             <a:fld id="{91C3B79F-EC10-4F20-9362-C4544C73AAEC}" type="datetimeFigureOut">
               <a:rPr lang="en-US" smtClean="0"/>
-              <a:t>11/12/17</a:t>
+              <a:t>11/13/2017</a:t>
             </a:fld>
             <a:endParaRPr lang="en-US"/>
           </a:p>
@@ -2350,7 +2350,7 @@
           <a:p>
             <a:fld id="{91C3B79F-EC10-4F20-9362-C4544C73AAEC}" type="datetimeFigureOut">
               <a:rPr lang="en-US" smtClean="0"/>
-              <a:t>11/12/17</a:t>
+              <a:t>11/13/2017</a:t>
             </a:fld>
             <a:endParaRPr lang="en-US"/>
           </a:p>
@@ -2463,7 +2463,7 @@
           <a:p>
             <a:fld id="{91C3B79F-EC10-4F20-9362-C4544C73AAEC}" type="datetimeFigureOut">
               <a:rPr lang="en-US" smtClean="0"/>
-              <a:t>11/12/17</a:t>
+              <a:t>11/13/2017</a:t>
             </a:fld>
             <a:endParaRPr lang="en-US"/>
           </a:p>
@@ -2774,7 +2774,7 @@
           <a:p>
             <a:fld id="{91C3B79F-EC10-4F20-9362-C4544C73AAEC}" type="datetimeFigureOut">
               <a:rPr lang="en-US" smtClean="0"/>
-              <a:t>11/12/17</a:t>
+              <a:t>11/13/2017</a:t>
             </a:fld>
             <a:endParaRPr lang="en-US"/>
           </a:p>
@@ -3062,7 +3062,7 @@
           <a:p>
             <a:fld id="{91C3B79F-EC10-4F20-9362-C4544C73AAEC}" type="datetimeFigureOut">
               <a:rPr lang="en-US" smtClean="0"/>
-              <a:t>11/12/17</a:t>
+              <a:t>11/13/2017</a:t>
             </a:fld>
             <a:endParaRPr lang="en-US"/>
           </a:p>
@@ -3303,7 +3303,7 @@
           <a:p>
             <a:fld id="{91C3B79F-EC10-4F20-9362-C4544C73AAEC}" type="datetimeFigureOut">
               <a:rPr lang="en-US" smtClean="0"/>
-              <a:t>11/12/17</a:t>
+              <a:t>11/13/2017</a:t>
             </a:fld>
             <a:endParaRPr lang="en-US"/>
           </a:p>
@@ -7080,6 +7080,13 @@
   <p:clrMapOvr>
     <a:overrideClrMapping bg1="dk1" tx1="lt1" bg2="dk2" tx2="lt2" accent1="accent1" accent2="accent2" accent3="accent3" accent4="accent4" accent5="accent5" accent6="accent6" hlink="hlink" folHlink="folHlink"/>
   </p:clrMapOvr>
+  <p:timing>
+    <p:tnLst>
+      <p:par>
+        <p:cTn id="1" dur="indefinite" restart="never" nodeType="tmRoot"/>
+      </p:par>
+    </p:tnLst>
+  </p:timing>
 </p:sld>
 </file>
 
@@ -7147,7 +7154,7 @@
   <p:timing>
     <p:tnLst>
       <p:par>
-        <p:cTn xmlns:p14="http://schemas.microsoft.com/office/powerpoint/2010/main" id="1" dur="indefinite" restart="never" nodeType="tmRoot"/>
+        <p:cTn id="1" dur="indefinite" restart="never" nodeType="tmRoot"/>
       </p:par>
     </p:tnLst>
   </p:timing>
@@ -7205,2378 +7212,64 @@
           </a:p>
         </p:txBody>
       </p:sp>
-      <p:graphicFrame>
-        <p:nvGraphicFramePr>
-          <p:cNvPr id="19" name="Table 18"/>
-          <p:cNvGraphicFramePr>
-            <a:graphicFrameLocks noGrp="1"/>
-          </p:cNvGraphicFramePr>
-          <p:nvPr>
-            <p:extLst>
-              <p:ext uri="{D42A27DB-BD31-4B8C-83A1-F6EECF244321}">
-                <p14:modId xmlns:p14="http://schemas.microsoft.com/office/powerpoint/2010/main" val="365240754"/>
-              </p:ext>
-            </p:extLst>
-          </p:nvPr>
-        </p:nvGraphicFramePr>
-        <p:xfrm>
-          <a:off x="4165573" y="6"/>
-          <a:ext cx="5772759" cy="6850004"/>
-        </p:xfrm>
-        <a:graphic>
-          <a:graphicData uri="http://schemas.openxmlformats.org/drawingml/2006/table">
-            <a:tbl>
-              <a:tblPr/>
-              <a:tblGrid>
-                <a:gridCol w="5772759"/>
-              </a:tblGrid>
-              <a:tr h="92259">
-                <a:tc>
-                  <a:txBody>
-                    <a:bodyPr/>
-                    <a:lstStyle/>
-                    <a:p>
-                      <a:pPr algn="l" fontAlgn="ctr"/>
-                      <a:r>
-                        <a:rPr lang="en-US" sz="900" b="0" i="0" u="none" strike="noStrike" dirty="0">
-                          <a:solidFill>
-                            <a:srgbClr val="000000"/>
-                          </a:solidFill>
-                          <a:effectLst/>
-                          <a:latin typeface="Lucida Console"/>
-                        </a:rPr>
-                        <a:t>Coefficients:</a:t>
-                      </a:r>
-                    </a:p>
-                  </a:txBody>
-                  <a:tcPr marL="3515" marR="3515" marT="2636" marB="0" anchor="ctr">
-                    <a:lnL w="6350" cap="flat" cmpd="sng" algn="ctr">
-                      <a:solidFill>
-                        <a:srgbClr val="000000"/>
-                      </a:solidFill>
-                      <a:prstDash val="solid"/>
-                      <a:round/>
-                      <a:headEnd type="none" w="med" len="med"/>
-                      <a:tailEnd type="none" w="med" len="med"/>
-                    </a:lnL>
-                    <a:lnR w="6350" cap="flat" cmpd="sng" algn="ctr">
-                      <a:solidFill>
-                        <a:srgbClr val="000000"/>
-                      </a:solidFill>
-                      <a:prstDash val="solid"/>
-                      <a:round/>
-                      <a:headEnd type="none" w="med" len="med"/>
-                      <a:tailEnd type="none" w="med" len="med"/>
-                    </a:lnR>
-                    <a:lnT w="6350" cap="flat" cmpd="sng" algn="ctr">
-                      <a:solidFill>
-                        <a:srgbClr val="000000"/>
-                      </a:solidFill>
-                      <a:prstDash val="solid"/>
-                      <a:round/>
-                      <a:headEnd type="none" w="med" len="med"/>
-                      <a:tailEnd type="none" w="med" len="med"/>
-                    </a:lnT>
-                    <a:lnB>
-                      <a:noFill/>
-                    </a:lnB>
-                  </a:tcPr>
-                </a:tc>
-              </a:tr>
-              <a:tr h="92259">
-                <a:tc>
-                  <a:txBody>
-                    <a:bodyPr/>
-                    <a:lstStyle/>
-                    <a:p>
-                      <a:pPr algn="l" fontAlgn="ctr"/>
-                      <a:r>
-                        <a:rPr lang="en-US" sz="900" b="0" i="0" u="none" strike="noStrike" dirty="0">
-                          <a:solidFill>
-                            <a:srgbClr val="000000"/>
-                          </a:solidFill>
-                          <a:effectLst/>
-                          <a:latin typeface="Lucida Console"/>
-                        </a:rPr>
-                        <a:t>                     Estimate Std. Error t value Pr(&gt;|t|)    </a:t>
-                      </a:r>
-                    </a:p>
-                  </a:txBody>
-                  <a:tcPr marL="3515" marR="3515" marT="2636" marB="0" anchor="ctr">
-                    <a:lnL w="6350" cap="flat" cmpd="sng" algn="ctr">
-                      <a:solidFill>
-                        <a:srgbClr val="000000"/>
-                      </a:solidFill>
-                      <a:prstDash val="solid"/>
-                      <a:round/>
-                      <a:headEnd type="none" w="med" len="med"/>
-                      <a:tailEnd type="none" w="med" len="med"/>
-                    </a:lnL>
-                    <a:lnR w="6350" cap="flat" cmpd="sng" algn="ctr">
-                      <a:solidFill>
-                        <a:srgbClr val="000000"/>
-                      </a:solidFill>
-                      <a:prstDash val="solid"/>
-                      <a:round/>
-                      <a:headEnd type="none" w="med" len="med"/>
-                      <a:tailEnd type="none" w="med" len="med"/>
-                    </a:lnR>
-                    <a:lnT>
-                      <a:noFill/>
-                    </a:lnT>
-                    <a:lnB>
-                      <a:noFill/>
-                    </a:lnB>
-                  </a:tcPr>
-                </a:tc>
-              </a:tr>
-              <a:tr h="92259">
-                <a:tc>
-                  <a:txBody>
-                    <a:bodyPr/>
-                    <a:lstStyle/>
-                    <a:p>
-                      <a:pPr algn="l" fontAlgn="ctr"/>
-                      <a:r>
-                        <a:rPr lang="pt-BR" sz="900" b="0" i="0" u="none" strike="noStrike">
-                          <a:solidFill>
-                            <a:srgbClr val="000000"/>
-                          </a:solidFill>
-                          <a:effectLst/>
-                          <a:latin typeface="Lucida Console"/>
-                        </a:rPr>
-                        <a:t>(Intercept)          1.12e+01   6.23e-02  179.81  &lt; 2e-16 ***</a:t>
-                      </a:r>
-                    </a:p>
-                  </a:txBody>
-                  <a:tcPr marL="3515" marR="3515" marT="2636" marB="0" anchor="ctr">
-                    <a:lnL w="6350" cap="flat" cmpd="sng" algn="ctr">
-                      <a:solidFill>
-                        <a:srgbClr val="000000"/>
-                      </a:solidFill>
-                      <a:prstDash val="solid"/>
-                      <a:round/>
-                      <a:headEnd type="none" w="med" len="med"/>
-                      <a:tailEnd type="none" w="med" len="med"/>
-                    </a:lnL>
-                    <a:lnR w="6350" cap="flat" cmpd="sng" algn="ctr">
-                      <a:solidFill>
-                        <a:srgbClr val="000000"/>
-                      </a:solidFill>
-                      <a:prstDash val="solid"/>
-                      <a:round/>
-                      <a:headEnd type="none" w="med" len="med"/>
-                      <a:tailEnd type="none" w="med" len="med"/>
-                    </a:lnR>
-                    <a:lnT>
-                      <a:noFill/>
-                    </a:lnT>
-                    <a:lnB>
-                      <a:noFill/>
-                    </a:lnB>
-                  </a:tcPr>
-                </a:tc>
-              </a:tr>
-              <a:tr h="92259">
-                <a:tc>
-                  <a:txBody>
-                    <a:bodyPr/>
-                    <a:lstStyle/>
-                    <a:p>
-                      <a:pPr algn="l" fontAlgn="ctr"/>
-                      <a:r>
-                        <a:rPr lang="en-US" sz="900" b="0" i="0" u="none" strike="noStrike" dirty="0">
-                          <a:solidFill>
-                            <a:srgbClr val="000000"/>
-                          </a:solidFill>
-                          <a:effectLst/>
-                          <a:latin typeface="Lucida Console"/>
-                        </a:rPr>
-                        <a:t>NeighborhoodBlueste -1.53e-01   9.97e-02   -1.53  0.12562    </a:t>
-                      </a:r>
-                    </a:p>
-                  </a:txBody>
-                  <a:tcPr marL="3515" marR="3515" marT="2636" marB="0" anchor="ctr">
-                    <a:lnL w="6350" cap="flat" cmpd="sng" algn="ctr">
-                      <a:solidFill>
-                        <a:srgbClr val="000000"/>
-                      </a:solidFill>
-                      <a:prstDash val="solid"/>
-                      <a:round/>
-                      <a:headEnd type="none" w="med" len="med"/>
-                      <a:tailEnd type="none" w="med" len="med"/>
-                    </a:lnL>
-                    <a:lnR w="6350" cap="flat" cmpd="sng" algn="ctr">
-                      <a:solidFill>
-                        <a:srgbClr val="000000"/>
-                      </a:solidFill>
-                      <a:prstDash val="solid"/>
-                      <a:round/>
-                      <a:headEnd type="none" w="med" len="med"/>
-                      <a:tailEnd type="none" w="med" len="med"/>
-                    </a:lnR>
-                    <a:lnT>
-                      <a:noFill/>
-                    </a:lnT>
-                    <a:lnB>
-                      <a:noFill/>
-                    </a:lnB>
-                  </a:tcPr>
-                </a:tc>
-              </a:tr>
-              <a:tr h="92259">
-                <a:tc>
-                  <a:txBody>
-                    <a:bodyPr/>
-                    <a:lstStyle/>
-                    <a:p>
-                      <a:pPr algn="l" fontAlgn="ctr"/>
-                      <a:r>
-                        <a:rPr lang="it-IT" sz="900" b="0" i="0" u="none" strike="noStrike">
-                          <a:solidFill>
-                            <a:srgbClr val="000000"/>
-                          </a:solidFill>
-                          <a:effectLst/>
-                          <a:latin typeface="Lucida Console"/>
-                        </a:rPr>
-                        <a:t>NeighborhoodBrDale  -2.44e-01   6.58e-02   -3.70  0.00023 ***</a:t>
-                      </a:r>
-                    </a:p>
-                  </a:txBody>
-                  <a:tcPr marL="3515" marR="3515" marT="2636" marB="0" anchor="ctr">
-                    <a:lnL w="6350" cap="flat" cmpd="sng" algn="ctr">
-                      <a:solidFill>
-                        <a:srgbClr val="000000"/>
-                      </a:solidFill>
-                      <a:prstDash val="solid"/>
-                      <a:round/>
-                      <a:headEnd type="none" w="med" len="med"/>
-                      <a:tailEnd type="none" w="med" len="med"/>
-                    </a:lnL>
-                    <a:lnR w="6350" cap="flat" cmpd="sng" algn="ctr">
-                      <a:solidFill>
-                        <a:srgbClr val="000000"/>
-                      </a:solidFill>
-                      <a:prstDash val="solid"/>
-                      <a:round/>
-                      <a:headEnd type="none" w="med" len="med"/>
-                      <a:tailEnd type="none" w="med" len="med"/>
-                    </a:lnR>
-                    <a:lnT>
-                      <a:noFill/>
-                    </a:lnT>
-                    <a:lnB>
-                      <a:noFill/>
-                    </a:lnB>
-                  </a:tcPr>
-                </a:tc>
-              </a:tr>
-              <a:tr h="92259">
-                <a:tc>
-                  <a:txBody>
-                    <a:bodyPr/>
-                    <a:lstStyle/>
-                    <a:p>
-                      <a:pPr algn="l" fontAlgn="ctr"/>
-                      <a:r>
-                        <a:rPr lang="en-US" sz="900" b="0" i="0" u="none" strike="noStrike" dirty="0">
-                          <a:solidFill>
-                            <a:srgbClr val="000000"/>
-                          </a:solidFill>
-                          <a:effectLst/>
-                          <a:latin typeface="Lucida Console"/>
-                        </a:rPr>
-                        <a:t>NeighborhoodBrkSide -2.11e-01   4.88e-02   -4.33  1.7e-05 ***</a:t>
-                      </a:r>
-                    </a:p>
-                  </a:txBody>
-                  <a:tcPr marL="3515" marR="3515" marT="2636" marB="0" anchor="ctr">
-                    <a:lnL w="6350" cap="flat" cmpd="sng" algn="ctr">
-                      <a:solidFill>
-                        <a:srgbClr val="000000"/>
-                      </a:solidFill>
-                      <a:prstDash val="solid"/>
-                      <a:round/>
-                      <a:headEnd type="none" w="med" len="med"/>
-                      <a:tailEnd type="none" w="med" len="med"/>
-                    </a:lnL>
-                    <a:lnR w="6350" cap="flat" cmpd="sng" algn="ctr">
-                      <a:solidFill>
-                        <a:srgbClr val="000000"/>
-                      </a:solidFill>
-                      <a:prstDash val="solid"/>
-                      <a:round/>
-                      <a:headEnd type="none" w="med" len="med"/>
-                      <a:tailEnd type="none" w="med" len="med"/>
-                    </a:lnR>
-                    <a:lnT>
-                      <a:noFill/>
-                    </a:lnT>
-                    <a:lnB>
-                      <a:noFill/>
-                    </a:lnB>
-                  </a:tcPr>
-                </a:tc>
-              </a:tr>
-              <a:tr h="92259">
-                <a:tc>
-                  <a:txBody>
-                    <a:bodyPr/>
-                    <a:lstStyle/>
-                    <a:p>
-                      <a:pPr algn="l" fontAlgn="ctr"/>
-                      <a:r>
-                        <a:rPr lang="en-US" sz="900" b="0" i="0" u="none" strike="noStrike" dirty="0">
-                          <a:solidFill>
-                            <a:srgbClr val="000000"/>
-                          </a:solidFill>
-                          <a:effectLst/>
-                          <a:latin typeface="Lucida Console"/>
-                        </a:rPr>
-                        <a:t>NeighborhoodClearCr -5.13e-02   5.42e-02   -0.95  0.34431    </a:t>
-                      </a:r>
-                    </a:p>
-                  </a:txBody>
-                  <a:tcPr marL="3515" marR="3515" marT="2636" marB="0" anchor="ctr">
-                    <a:lnL w="6350" cap="flat" cmpd="sng" algn="ctr">
-                      <a:solidFill>
-                        <a:srgbClr val="000000"/>
-                      </a:solidFill>
-                      <a:prstDash val="solid"/>
-                      <a:round/>
-                      <a:headEnd type="none" w="med" len="med"/>
-                      <a:tailEnd type="none" w="med" len="med"/>
-                    </a:lnL>
-                    <a:lnR w="6350" cap="flat" cmpd="sng" algn="ctr">
-                      <a:solidFill>
-                        <a:srgbClr val="000000"/>
-                      </a:solidFill>
-                      <a:prstDash val="solid"/>
-                      <a:round/>
-                      <a:headEnd type="none" w="med" len="med"/>
-                      <a:tailEnd type="none" w="med" len="med"/>
-                    </a:lnR>
-                    <a:lnT>
-                      <a:noFill/>
-                    </a:lnT>
-                    <a:lnB>
-                      <a:noFill/>
-                    </a:lnB>
-                  </a:tcPr>
-                </a:tc>
-              </a:tr>
-              <a:tr h="92259">
-                <a:tc>
-                  <a:txBody>
-                    <a:bodyPr/>
-                    <a:lstStyle/>
-                    <a:p>
-                      <a:pPr algn="l" fontAlgn="ctr"/>
-                      <a:r>
-                        <a:rPr lang="en-US" sz="900" b="0" i="0" u="none" strike="noStrike" dirty="0">
-                          <a:solidFill>
-                            <a:srgbClr val="000000"/>
-                          </a:solidFill>
-                          <a:effectLst/>
-                          <a:latin typeface="Lucida Console"/>
-                        </a:rPr>
-                        <a:t>NeighborhoodCollgCr -4.21e-02   4.45e-02   -0.95  0.34405    </a:t>
-                      </a:r>
-                    </a:p>
-                  </a:txBody>
-                  <a:tcPr marL="3515" marR="3515" marT="2636" marB="0" anchor="ctr">
-                    <a:lnL w="6350" cap="flat" cmpd="sng" algn="ctr">
-                      <a:solidFill>
-                        <a:srgbClr val="000000"/>
-                      </a:solidFill>
-                      <a:prstDash val="solid"/>
-                      <a:round/>
-                      <a:headEnd type="none" w="med" len="med"/>
-                      <a:tailEnd type="none" w="med" len="med"/>
-                    </a:lnL>
-                    <a:lnR w="6350" cap="flat" cmpd="sng" algn="ctr">
-                      <a:solidFill>
-                        <a:srgbClr val="000000"/>
-                      </a:solidFill>
-                      <a:prstDash val="solid"/>
-                      <a:round/>
-                      <a:headEnd type="none" w="med" len="med"/>
-                      <a:tailEnd type="none" w="med" len="med"/>
-                    </a:lnR>
-                    <a:lnT>
-                      <a:noFill/>
-                    </a:lnT>
-                    <a:lnB>
-                      <a:noFill/>
-                    </a:lnB>
-                  </a:tcPr>
-                </a:tc>
-              </a:tr>
-              <a:tr h="92259">
-                <a:tc>
-                  <a:txBody>
-                    <a:bodyPr/>
-                    <a:lstStyle/>
-                    <a:p>
-                      <a:pPr algn="l" fontAlgn="ctr"/>
-                      <a:r>
-                        <a:rPr lang="en-US" sz="900" b="0" i="0" u="none" strike="noStrike" dirty="0">
-                          <a:solidFill>
-                            <a:srgbClr val="000000"/>
-                          </a:solidFill>
-                          <a:effectLst/>
-                          <a:latin typeface="Lucida Console"/>
-                        </a:rPr>
-                        <a:t>NeighborhoodCrawfor -3.49e-02   4.92e-02   -0.71  0.47829    </a:t>
-                      </a:r>
-                    </a:p>
-                  </a:txBody>
-                  <a:tcPr marL="3515" marR="3515" marT="2636" marB="0" anchor="ctr">
-                    <a:lnL w="6350" cap="flat" cmpd="sng" algn="ctr">
-                      <a:solidFill>
-                        <a:srgbClr val="000000"/>
-                      </a:solidFill>
-                      <a:prstDash val="solid"/>
-                      <a:round/>
-                      <a:headEnd type="none" w="med" len="med"/>
-                      <a:tailEnd type="none" w="med" len="med"/>
-                    </a:lnL>
-                    <a:lnR w="6350" cap="flat" cmpd="sng" algn="ctr">
-                      <a:solidFill>
-                        <a:srgbClr val="000000"/>
-                      </a:solidFill>
-                      <a:prstDash val="solid"/>
-                      <a:round/>
-                      <a:headEnd type="none" w="med" len="med"/>
-                      <a:tailEnd type="none" w="med" len="med"/>
-                    </a:lnR>
-                    <a:lnT>
-                      <a:noFill/>
-                    </a:lnT>
-                    <a:lnB>
-                      <a:noFill/>
-                    </a:lnB>
-                  </a:tcPr>
-                </a:tc>
-              </a:tr>
-              <a:tr h="92259">
-                <a:tc>
-                  <a:txBody>
-                    <a:bodyPr/>
-                    <a:lstStyle/>
-                    <a:p>
-                      <a:pPr algn="l" fontAlgn="ctr"/>
-                      <a:r>
-                        <a:rPr lang="en-US" sz="900" b="0" i="0" u="none" strike="noStrike" dirty="0">
-                          <a:solidFill>
-                            <a:srgbClr val="000000"/>
-                          </a:solidFill>
-                          <a:effectLst/>
-                          <a:latin typeface="Lucida Console"/>
-                        </a:rPr>
-                        <a:t>NeighborhoodEdwards -2.24e-01   4.68e-02   -4.79  1.9e-06 ***</a:t>
-                      </a:r>
-                    </a:p>
-                  </a:txBody>
-                  <a:tcPr marL="3515" marR="3515" marT="2636" marB="0" anchor="ctr">
-                    <a:lnL w="6350" cap="flat" cmpd="sng" algn="ctr">
-                      <a:solidFill>
-                        <a:srgbClr val="000000"/>
-                      </a:solidFill>
-                      <a:prstDash val="solid"/>
-                      <a:round/>
-                      <a:headEnd type="none" w="med" len="med"/>
-                      <a:tailEnd type="none" w="med" len="med"/>
-                    </a:lnL>
-                    <a:lnR w="6350" cap="flat" cmpd="sng" algn="ctr">
-                      <a:solidFill>
-                        <a:srgbClr val="000000"/>
-                      </a:solidFill>
-                      <a:prstDash val="solid"/>
-                      <a:round/>
-                      <a:headEnd type="none" w="med" len="med"/>
-                      <a:tailEnd type="none" w="med" len="med"/>
-                    </a:lnR>
-                    <a:lnT>
-                      <a:noFill/>
-                    </a:lnT>
-                    <a:lnB>
-                      <a:noFill/>
-                    </a:lnB>
-                  </a:tcPr>
-                </a:tc>
-              </a:tr>
-              <a:tr h="92259">
-                <a:tc>
-                  <a:txBody>
-                    <a:bodyPr/>
-                    <a:lstStyle/>
-                    <a:p>
-                      <a:pPr algn="l" fontAlgn="ctr"/>
-                      <a:r>
-                        <a:rPr lang="en-US" sz="900" b="0" i="0" u="none" strike="noStrike" dirty="0">
-                          <a:solidFill>
-                            <a:srgbClr val="000000"/>
-                          </a:solidFill>
-                          <a:effectLst/>
-                          <a:latin typeface="Lucida Console"/>
-                        </a:rPr>
-                        <a:t>NeighborhoodGilbert  3.32e-02   4.74e-02    0.70  0.48435    </a:t>
-                      </a:r>
-                    </a:p>
-                  </a:txBody>
-                  <a:tcPr marL="3515" marR="3515" marT="2636" marB="0" anchor="ctr">
-                    <a:lnL w="6350" cap="flat" cmpd="sng" algn="ctr">
-                      <a:solidFill>
-                        <a:srgbClr val="000000"/>
-                      </a:solidFill>
-                      <a:prstDash val="solid"/>
-                      <a:round/>
-                      <a:headEnd type="none" w="med" len="med"/>
-                      <a:tailEnd type="none" w="med" len="med"/>
-                    </a:lnL>
-                    <a:lnR w="6350" cap="flat" cmpd="sng" algn="ctr">
-                      <a:solidFill>
-                        <a:srgbClr val="000000"/>
-                      </a:solidFill>
-                      <a:prstDash val="solid"/>
-                      <a:round/>
-                      <a:headEnd type="none" w="med" len="med"/>
-                      <a:tailEnd type="none" w="med" len="med"/>
-                    </a:lnR>
-                    <a:lnT>
-                      <a:noFill/>
-                    </a:lnT>
-                    <a:lnB>
-                      <a:noFill/>
-                    </a:lnB>
-                  </a:tcPr>
-                </a:tc>
-              </a:tr>
-              <a:tr h="92259">
-                <a:tc>
-                  <a:txBody>
-                    <a:bodyPr/>
-                    <a:lstStyle/>
-                    <a:p>
-                      <a:pPr algn="l" fontAlgn="ctr"/>
-                      <a:r>
-                        <a:rPr lang="it-IT" sz="900" b="0" i="0" u="none" strike="noStrike">
-                          <a:solidFill>
-                            <a:srgbClr val="000000"/>
-                          </a:solidFill>
-                          <a:effectLst/>
-                          <a:latin typeface="Lucida Console"/>
-                        </a:rPr>
-                        <a:t>NeighborhoodIDOTRR  -3.58e-01   5.35e-02   -6.69  3.8e-11 ***</a:t>
-                      </a:r>
-                    </a:p>
-                  </a:txBody>
-                  <a:tcPr marL="3515" marR="3515" marT="2636" marB="0" anchor="ctr">
-                    <a:lnL w="6350" cap="flat" cmpd="sng" algn="ctr">
-                      <a:solidFill>
-                        <a:srgbClr val="000000"/>
-                      </a:solidFill>
-                      <a:prstDash val="solid"/>
-                      <a:round/>
-                      <a:headEnd type="none" w="med" len="med"/>
-                      <a:tailEnd type="none" w="med" len="med"/>
-                    </a:lnL>
-                    <a:lnR w="6350" cap="flat" cmpd="sng" algn="ctr">
-                      <a:solidFill>
-                        <a:srgbClr val="000000"/>
-                      </a:solidFill>
-                      <a:prstDash val="solid"/>
-                      <a:round/>
-                      <a:headEnd type="none" w="med" len="med"/>
-                      <a:tailEnd type="none" w="med" len="med"/>
-                    </a:lnR>
-                    <a:lnT>
-                      <a:noFill/>
-                    </a:lnT>
-                    <a:lnB>
-                      <a:noFill/>
-                    </a:lnB>
-                  </a:tcPr>
-                </a:tc>
-              </a:tr>
-              <a:tr h="92259">
-                <a:tc>
-                  <a:txBody>
-                    <a:bodyPr/>
-                    <a:lstStyle/>
-                    <a:p>
-                      <a:pPr algn="l" fontAlgn="ctr"/>
-                      <a:r>
-                        <a:rPr lang="en-US" sz="900" b="0" i="0" u="none" strike="noStrike" dirty="0">
-                          <a:solidFill>
-                            <a:srgbClr val="000000"/>
-                          </a:solidFill>
-                          <a:effectLst/>
-                          <a:latin typeface="Lucida Console"/>
-                        </a:rPr>
-                        <a:t>NeighborhoodMeadowV -3.45e-01   5.96e-02   -5.79  9.7e-09 ***</a:t>
-                      </a:r>
-                    </a:p>
-                  </a:txBody>
-                  <a:tcPr marL="3515" marR="3515" marT="2636" marB="0" anchor="ctr">
-                    <a:lnL w="6350" cap="flat" cmpd="sng" algn="ctr">
-                      <a:solidFill>
-                        <a:srgbClr val="000000"/>
-                      </a:solidFill>
-                      <a:prstDash val="solid"/>
-                      <a:round/>
-                      <a:headEnd type="none" w="med" len="med"/>
-                      <a:tailEnd type="none" w="med" len="med"/>
-                    </a:lnL>
-                    <a:lnR w="6350" cap="flat" cmpd="sng" algn="ctr">
-                      <a:solidFill>
-                        <a:srgbClr val="000000"/>
-                      </a:solidFill>
-                      <a:prstDash val="solid"/>
-                      <a:round/>
-                      <a:headEnd type="none" w="med" len="med"/>
-                      <a:tailEnd type="none" w="med" len="med"/>
-                    </a:lnR>
-                    <a:lnT>
-                      <a:noFill/>
-                    </a:lnT>
-                    <a:lnB>
-                      <a:noFill/>
-                    </a:lnB>
-                  </a:tcPr>
-                </a:tc>
-              </a:tr>
-              <a:tr h="92259">
-                <a:tc>
-                  <a:txBody>
-                    <a:bodyPr/>
-                    <a:lstStyle/>
-                    <a:p>
-                      <a:pPr algn="l" fontAlgn="ctr"/>
-                      <a:r>
-                        <a:rPr lang="en-US" sz="900" b="0" i="0" u="none" strike="noStrike" dirty="0">
-                          <a:solidFill>
-                            <a:srgbClr val="000000"/>
-                          </a:solidFill>
-                          <a:effectLst/>
-                          <a:latin typeface="Lucida Console"/>
-                        </a:rPr>
-                        <a:t>NeighborhoodMitchel -1.36e-01   4.88e-02   -2.78  0.00561 ** </a:t>
-                      </a:r>
-                    </a:p>
-                  </a:txBody>
-                  <a:tcPr marL="3515" marR="3515" marT="2636" marB="0" anchor="ctr">
-                    <a:lnL w="6350" cap="flat" cmpd="sng" algn="ctr">
-                      <a:solidFill>
-                        <a:srgbClr val="000000"/>
-                      </a:solidFill>
-                      <a:prstDash val="solid"/>
-                      <a:round/>
-                      <a:headEnd type="none" w="med" len="med"/>
-                      <a:tailEnd type="none" w="med" len="med"/>
-                    </a:lnL>
-                    <a:lnR w="6350" cap="flat" cmpd="sng" algn="ctr">
-                      <a:solidFill>
-                        <a:srgbClr val="000000"/>
-                      </a:solidFill>
-                      <a:prstDash val="solid"/>
-                      <a:round/>
-                      <a:headEnd type="none" w="med" len="med"/>
-                      <a:tailEnd type="none" w="med" len="med"/>
-                    </a:lnR>
-                    <a:lnT>
-                      <a:noFill/>
-                    </a:lnT>
-                    <a:lnB>
-                      <a:noFill/>
-                    </a:lnB>
-                  </a:tcPr>
-                </a:tc>
-              </a:tr>
-              <a:tr h="92259">
-                <a:tc>
-                  <a:txBody>
-                    <a:bodyPr/>
-                    <a:lstStyle/>
-                    <a:p>
-                      <a:pPr algn="l" fontAlgn="ctr"/>
-                      <a:r>
-                        <a:rPr lang="en-US" sz="900" b="0" i="0" u="none" strike="noStrike" dirty="0">
-                          <a:solidFill>
-                            <a:srgbClr val="000000"/>
-                          </a:solidFill>
-                          <a:effectLst/>
-                          <a:latin typeface="Lucida Console"/>
-                        </a:rPr>
-                        <a:t>NeighborhoodNAmes   -1.69e-01   4.52e-02   -3.74  0.00020 ***</a:t>
-                      </a:r>
-                    </a:p>
-                  </a:txBody>
-                  <a:tcPr marL="3515" marR="3515" marT="2636" marB="0" anchor="ctr">
-                    <a:lnL w="6350" cap="flat" cmpd="sng" algn="ctr">
-                      <a:solidFill>
-                        <a:srgbClr val="000000"/>
-                      </a:solidFill>
-                      <a:prstDash val="solid"/>
-                      <a:round/>
-                      <a:headEnd type="none" w="med" len="med"/>
-                      <a:tailEnd type="none" w="med" len="med"/>
-                    </a:lnL>
-                    <a:lnR w="6350" cap="flat" cmpd="sng" algn="ctr">
-                      <a:solidFill>
-                        <a:srgbClr val="000000"/>
-                      </a:solidFill>
-                      <a:prstDash val="solid"/>
-                      <a:round/>
-                      <a:headEnd type="none" w="med" len="med"/>
-                      <a:tailEnd type="none" w="med" len="med"/>
-                    </a:lnR>
-                    <a:lnT>
-                      <a:noFill/>
-                    </a:lnT>
-                    <a:lnB>
-                      <a:noFill/>
-                    </a:lnB>
-                  </a:tcPr>
-                </a:tc>
-              </a:tr>
-              <a:tr h="92259">
-                <a:tc>
-                  <a:txBody>
-                    <a:bodyPr/>
-                    <a:lstStyle/>
-                    <a:p>
-                      <a:pPr algn="l" fontAlgn="ctr"/>
-                      <a:r>
-                        <a:rPr lang="en-US" sz="900" b="0" i="0" u="none" strike="noStrike" dirty="0">
-                          <a:solidFill>
-                            <a:srgbClr val="000000"/>
-                          </a:solidFill>
-                          <a:effectLst/>
-                          <a:latin typeface="Lucida Console"/>
-                        </a:rPr>
-                        <a:t>NeighborhoodNoRidge  1.13e-02   5.01e-02    0.23  0.82087    </a:t>
-                      </a:r>
-                    </a:p>
-                  </a:txBody>
-                  <a:tcPr marL="3515" marR="3515" marT="2636" marB="0" anchor="ctr">
-                    <a:lnL w="6350" cap="flat" cmpd="sng" algn="ctr">
-                      <a:solidFill>
-                        <a:srgbClr val="000000"/>
-                      </a:solidFill>
-                      <a:prstDash val="solid"/>
-                      <a:round/>
-                      <a:headEnd type="none" w="med" len="med"/>
-                      <a:tailEnd type="none" w="med" len="med"/>
-                    </a:lnL>
-                    <a:lnR w="6350" cap="flat" cmpd="sng" algn="ctr">
-                      <a:solidFill>
-                        <a:srgbClr val="000000"/>
-                      </a:solidFill>
-                      <a:prstDash val="solid"/>
-                      <a:round/>
-                      <a:headEnd type="none" w="med" len="med"/>
-                      <a:tailEnd type="none" w="med" len="med"/>
-                    </a:lnR>
-                    <a:lnT>
-                      <a:noFill/>
-                    </a:lnT>
-                    <a:lnB>
-                      <a:noFill/>
-                    </a:lnB>
-                  </a:tcPr>
-                </a:tc>
-              </a:tr>
-              <a:tr h="92259">
-                <a:tc>
-                  <a:txBody>
-                    <a:bodyPr/>
-                    <a:lstStyle/>
-                    <a:p>
-                      <a:pPr algn="l" fontAlgn="ctr"/>
-                      <a:r>
-                        <a:rPr lang="en-US" sz="900" b="0" i="0" u="none" strike="noStrike" dirty="0">
-                          <a:solidFill>
-                            <a:srgbClr val="000000"/>
-                          </a:solidFill>
-                          <a:effectLst/>
-                          <a:latin typeface="Lucida Console"/>
-                        </a:rPr>
-                        <a:t>NeighborhoodNPkVill -1.24e-01   6.51e-02   -1.90  0.05725 .  </a:t>
-                      </a:r>
-                    </a:p>
-                  </a:txBody>
-                  <a:tcPr marL="3515" marR="3515" marT="2636" marB="0" anchor="ctr">
-                    <a:lnL w="6350" cap="flat" cmpd="sng" algn="ctr">
-                      <a:solidFill>
-                        <a:srgbClr val="000000"/>
-                      </a:solidFill>
-                      <a:prstDash val="solid"/>
-                      <a:round/>
-                      <a:headEnd type="none" w="med" len="med"/>
-                      <a:tailEnd type="none" w="med" len="med"/>
-                    </a:lnL>
-                    <a:lnR w="6350" cap="flat" cmpd="sng" algn="ctr">
-                      <a:solidFill>
-                        <a:srgbClr val="000000"/>
-                      </a:solidFill>
-                      <a:prstDash val="solid"/>
-                      <a:round/>
-                      <a:headEnd type="none" w="med" len="med"/>
-                      <a:tailEnd type="none" w="med" len="med"/>
-                    </a:lnR>
-                    <a:lnT>
-                      <a:noFill/>
-                    </a:lnT>
-                    <a:lnB>
-                      <a:noFill/>
-                    </a:lnB>
-                  </a:tcPr>
-                </a:tc>
-              </a:tr>
-              <a:tr h="92259">
-                <a:tc>
-                  <a:txBody>
-                    <a:bodyPr/>
-                    <a:lstStyle/>
-                    <a:p>
-                      <a:pPr algn="l" fontAlgn="ctr"/>
-                      <a:r>
-                        <a:rPr lang="en-US" sz="900" b="0" i="0" u="none" strike="noStrike" dirty="0">
-                          <a:solidFill>
-                            <a:srgbClr val="000000"/>
-                          </a:solidFill>
-                          <a:effectLst/>
-                          <a:latin typeface="Lucida Console"/>
-                        </a:rPr>
-                        <a:t>NeighborhoodNridgHt  2.72e-02   4.88e-02    0.56  0.57705    </a:t>
-                      </a:r>
-                    </a:p>
-                  </a:txBody>
-                  <a:tcPr marL="3515" marR="3515" marT="2636" marB="0" anchor="ctr">
-                    <a:lnL w="6350" cap="flat" cmpd="sng" algn="ctr">
-                      <a:solidFill>
-                        <a:srgbClr val="000000"/>
-                      </a:solidFill>
-                      <a:prstDash val="solid"/>
-                      <a:round/>
-                      <a:headEnd type="none" w="med" len="med"/>
-                      <a:tailEnd type="none" w="med" len="med"/>
-                    </a:lnL>
-                    <a:lnR w="6350" cap="flat" cmpd="sng" algn="ctr">
-                      <a:solidFill>
-                        <a:srgbClr val="000000"/>
-                      </a:solidFill>
-                      <a:prstDash val="solid"/>
-                      <a:round/>
-                      <a:headEnd type="none" w="med" len="med"/>
-                      <a:tailEnd type="none" w="med" len="med"/>
-                    </a:lnR>
-                    <a:lnT>
-                      <a:noFill/>
-                    </a:lnT>
-                    <a:lnB w="6350" cap="flat" cmpd="sng" algn="ctr">
-                      <a:solidFill>
-                        <a:srgbClr val="000000"/>
-                      </a:solidFill>
-                      <a:prstDash val="solid"/>
-                      <a:round/>
-                      <a:headEnd type="none" w="med" len="med"/>
-                      <a:tailEnd type="none" w="med" len="med"/>
-                    </a:lnB>
-                  </a:tcPr>
-                </a:tc>
-              </a:tr>
-              <a:tr h="92259">
-                <a:tc>
-                  <a:txBody>
-                    <a:bodyPr/>
-                    <a:lstStyle/>
-                    <a:p>
-                      <a:pPr algn="l" fontAlgn="ctr"/>
-                      <a:r>
-                        <a:rPr lang="en-US" sz="900" b="0" i="0" u="none" strike="noStrike" dirty="0">
-                          <a:solidFill>
-                            <a:srgbClr val="000000"/>
-                          </a:solidFill>
-                          <a:effectLst/>
-                          <a:latin typeface="Lucida Console"/>
-                        </a:rPr>
-                        <a:t>NeighborhoodNWAmes  -1.09e-01   4.71e-02   -2.30  0.02152 *  </a:t>
-                      </a:r>
-                    </a:p>
-                  </a:txBody>
-                  <a:tcPr marL="3515" marR="3515" marT="2636" marB="0" anchor="ctr">
-                    <a:lnL w="6350" cap="flat" cmpd="sng" algn="ctr">
-                      <a:solidFill>
-                        <a:srgbClr val="000000"/>
-                      </a:solidFill>
-                      <a:prstDash val="solid"/>
-                      <a:round/>
-                      <a:headEnd type="none" w="med" len="med"/>
-                      <a:tailEnd type="none" w="med" len="med"/>
-                    </a:lnL>
-                    <a:lnR w="6350" cap="flat" cmpd="sng" algn="ctr">
-                      <a:solidFill>
-                        <a:srgbClr val="000000"/>
-                      </a:solidFill>
-                      <a:prstDash val="solid"/>
-                      <a:round/>
-                      <a:headEnd type="none" w="med" len="med"/>
-                      <a:tailEnd type="none" w="med" len="med"/>
-                    </a:lnR>
-                    <a:lnT w="6350" cap="flat" cmpd="sng" algn="ctr">
-                      <a:solidFill>
-                        <a:srgbClr val="000000"/>
-                      </a:solidFill>
-                      <a:prstDash val="solid"/>
-                      <a:round/>
-                      <a:headEnd type="none" w="med" len="med"/>
-                      <a:tailEnd type="none" w="med" len="med"/>
-                    </a:lnT>
-                    <a:lnB w="6350" cap="flat" cmpd="sng" algn="ctr">
-                      <a:solidFill>
-                        <a:srgbClr val="000000"/>
-                      </a:solidFill>
-                      <a:prstDash val="solid"/>
-                      <a:round/>
-                      <a:headEnd type="none" w="med" len="med"/>
-                      <a:tailEnd type="none" w="med" len="med"/>
-                    </a:lnB>
-                  </a:tcPr>
-                </a:tc>
-              </a:tr>
-              <a:tr h="92259">
-                <a:tc>
-                  <a:txBody>
-                    <a:bodyPr/>
-                    <a:lstStyle/>
-                    <a:p>
-                      <a:pPr algn="l" fontAlgn="ctr"/>
-                      <a:r>
-                        <a:rPr lang="it-IT" sz="900" b="0" i="0" u="none" strike="noStrike" dirty="0">
-                          <a:solidFill>
-                            <a:srgbClr val="000000"/>
-                          </a:solidFill>
-                          <a:effectLst/>
-                          <a:latin typeface="Lucida Console"/>
-                        </a:rPr>
-                        <a:t>NeighborhoodOldTown -3.35e-01   4.70e-02   -7.12  2.2e-12 ***</a:t>
-                      </a:r>
-                    </a:p>
-                  </a:txBody>
-                  <a:tcPr marL="3515" marR="3515" marT="2636" marB="0" anchor="ctr">
-                    <a:lnL w="6350" cap="flat" cmpd="sng" algn="ctr">
-                      <a:solidFill>
-                        <a:srgbClr val="000000"/>
-                      </a:solidFill>
-                      <a:prstDash val="solid"/>
-                      <a:round/>
-                      <a:headEnd type="none" w="med" len="med"/>
-                      <a:tailEnd type="none" w="med" len="med"/>
-                    </a:lnL>
-                    <a:lnR w="6350" cap="flat" cmpd="sng" algn="ctr">
-                      <a:solidFill>
-                        <a:srgbClr val="000000"/>
-                      </a:solidFill>
-                      <a:prstDash val="solid"/>
-                      <a:round/>
-                      <a:headEnd type="none" w="med" len="med"/>
-                      <a:tailEnd type="none" w="med" len="med"/>
-                    </a:lnR>
-                    <a:lnT w="6350" cap="flat" cmpd="sng" algn="ctr">
-                      <a:solidFill>
-                        <a:srgbClr val="000000"/>
-                      </a:solidFill>
-                      <a:prstDash val="solid"/>
-                      <a:round/>
-                      <a:headEnd type="none" w="med" len="med"/>
-                      <a:tailEnd type="none" w="med" len="med"/>
-                    </a:lnT>
-                    <a:lnB>
-                      <a:noFill/>
-                    </a:lnB>
-                  </a:tcPr>
-                </a:tc>
-              </a:tr>
-              <a:tr h="92259">
-                <a:tc>
-                  <a:txBody>
-                    <a:bodyPr/>
-                    <a:lstStyle/>
-                    <a:p>
-                      <a:pPr algn="l" fontAlgn="ctr"/>
-                      <a:r>
-                        <a:rPr lang="en-US" sz="900" b="0" i="0" u="none" strike="noStrike" dirty="0">
-                          <a:solidFill>
-                            <a:srgbClr val="000000"/>
-                          </a:solidFill>
-                          <a:effectLst/>
-                          <a:latin typeface="Lucida Console"/>
-                        </a:rPr>
-                        <a:t>NeighborhoodSawyer  -1.74e-01   4.72e-02   -3.68  0.00025 ***</a:t>
-                      </a:r>
-                    </a:p>
-                  </a:txBody>
-                  <a:tcPr marL="3515" marR="3515" marT="2636" marB="0" anchor="ctr">
-                    <a:lnL w="6350" cap="flat" cmpd="sng" algn="ctr">
-                      <a:solidFill>
-                        <a:srgbClr val="000000"/>
-                      </a:solidFill>
-                      <a:prstDash val="solid"/>
-                      <a:round/>
-                      <a:headEnd type="none" w="med" len="med"/>
-                      <a:tailEnd type="none" w="med" len="med"/>
-                    </a:lnL>
-                    <a:lnR w="6350" cap="flat" cmpd="sng" algn="ctr">
-                      <a:solidFill>
-                        <a:srgbClr val="000000"/>
-                      </a:solidFill>
-                      <a:prstDash val="solid"/>
-                      <a:round/>
-                      <a:headEnd type="none" w="med" len="med"/>
-                      <a:tailEnd type="none" w="med" len="med"/>
-                    </a:lnR>
-                    <a:lnT>
-                      <a:noFill/>
-                    </a:lnT>
-                    <a:lnB>
-                      <a:noFill/>
-                    </a:lnB>
-                  </a:tcPr>
-                </a:tc>
-              </a:tr>
-              <a:tr h="92259">
-                <a:tc>
-                  <a:txBody>
-                    <a:bodyPr/>
-                    <a:lstStyle/>
-                    <a:p>
-                      <a:pPr algn="l" fontAlgn="ctr"/>
-                      <a:r>
-                        <a:rPr lang="en-US" sz="900" b="0" i="0" u="none" strike="noStrike" dirty="0">
-                          <a:solidFill>
-                            <a:srgbClr val="000000"/>
-                          </a:solidFill>
-                          <a:effectLst/>
-                          <a:latin typeface="Lucida Console"/>
-                        </a:rPr>
-                        <a:t>NeighborhoodSawyerW -1.02e-01   4.75e-02   -2.16  0.03115 *  </a:t>
-                      </a:r>
-                    </a:p>
-                  </a:txBody>
-                  <a:tcPr marL="3515" marR="3515" marT="2636" marB="0" anchor="ctr">
-                    <a:lnL w="6350" cap="flat" cmpd="sng" algn="ctr">
-                      <a:solidFill>
-                        <a:srgbClr val="000000"/>
-                      </a:solidFill>
-                      <a:prstDash val="solid"/>
-                      <a:round/>
-                      <a:headEnd type="none" w="med" len="med"/>
-                      <a:tailEnd type="none" w="med" len="med"/>
-                    </a:lnL>
-                    <a:lnR w="6350" cap="flat" cmpd="sng" algn="ctr">
-                      <a:solidFill>
-                        <a:srgbClr val="000000"/>
-                      </a:solidFill>
-                      <a:prstDash val="solid"/>
-                      <a:round/>
-                      <a:headEnd type="none" w="med" len="med"/>
-                      <a:tailEnd type="none" w="med" len="med"/>
-                    </a:lnR>
-                    <a:lnT>
-                      <a:noFill/>
-                    </a:lnT>
-                    <a:lnB>
-                      <a:noFill/>
-                    </a:lnB>
-                  </a:tcPr>
-                </a:tc>
-              </a:tr>
-              <a:tr h="92259">
-                <a:tc>
-                  <a:txBody>
-                    <a:bodyPr/>
-                    <a:lstStyle/>
-                    <a:p>
-                      <a:pPr algn="l" fontAlgn="ctr"/>
-                      <a:r>
-                        <a:rPr lang="en-US" sz="900" b="0" i="0" u="none" strike="noStrike" dirty="0">
-                          <a:solidFill>
-                            <a:srgbClr val="000000"/>
-                          </a:solidFill>
-                          <a:effectLst/>
-                          <a:latin typeface="Lucida Console"/>
-                        </a:rPr>
-                        <a:t>NeighborhoodSomerst  3.97e-02   4.74e-02    0.84  0.40226    </a:t>
-                      </a:r>
-                    </a:p>
-                  </a:txBody>
-                  <a:tcPr marL="3515" marR="3515" marT="2636" marB="0" anchor="ctr">
-                    <a:lnL w="6350" cap="flat" cmpd="sng" algn="ctr">
-                      <a:solidFill>
-                        <a:srgbClr val="000000"/>
-                      </a:solidFill>
-                      <a:prstDash val="solid"/>
-                      <a:round/>
-                      <a:headEnd type="none" w="med" len="med"/>
-                      <a:tailEnd type="none" w="med" len="med"/>
-                    </a:lnL>
-                    <a:lnR w="6350" cap="flat" cmpd="sng" algn="ctr">
-                      <a:solidFill>
-                        <a:srgbClr val="000000"/>
-                      </a:solidFill>
-                      <a:prstDash val="solid"/>
-                      <a:round/>
-                      <a:headEnd type="none" w="med" len="med"/>
-                      <a:tailEnd type="none" w="med" len="med"/>
-                    </a:lnR>
-                    <a:lnT>
-                      <a:noFill/>
-                    </a:lnT>
-                    <a:lnB>
-                      <a:noFill/>
-                    </a:lnB>
-                  </a:tcPr>
-                </a:tc>
-              </a:tr>
-              <a:tr h="92259">
-                <a:tc>
-                  <a:txBody>
-                    <a:bodyPr/>
-                    <a:lstStyle/>
-                    <a:p>
-                      <a:pPr algn="l" fontAlgn="ctr"/>
-                      <a:r>
-                        <a:rPr lang="en-US" sz="900" b="0" i="0" u="none" strike="noStrike" dirty="0">
-                          <a:solidFill>
-                            <a:srgbClr val="000000"/>
-                          </a:solidFill>
-                          <a:effectLst/>
-                          <a:latin typeface="Lucida Console"/>
-                        </a:rPr>
-                        <a:t>NeighborhoodStoneBr  4.00e-02   5.76e-02    0.69  0.48735    </a:t>
-                      </a:r>
-                    </a:p>
-                  </a:txBody>
-                  <a:tcPr marL="3515" marR="3515" marT="2636" marB="0" anchor="ctr">
-                    <a:lnL w="6350" cap="flat" cmpd="sng" algn="ctr">
-                      <a:solidFill>
-                        <a:srgbClr val="000000"/>
-                      </a:solidFill>
-                      <a:prstDash val="solid"/>
-                      <a:round/>
-                      <a:headEnd type="none" w="med" len="med"/>
-                      <a:tailEnd type="none" w="med" len="med"/>
-                    </a:lnL>
-                    <a:lnR w="6350" cap="flat" cmpd="sng" algn="ctr">
-                      <a:solidFill>
-                        <a:srgbClr val="000000"/>
-                      </a:solidFill>
-                      <a:prstDash val="solid"/>
-                      <a:round/>
-                      <a:headEnd type="none" w="med" len="med"/>
-                      <a:tailEnd type="none" w="med" len="med"/>
-                    </a:lnR>
-                    <a:lnT>
-                      <a:noFill/>
-                    </a:lnT>
-                    <a:lnB>
-                      <a:noFill/>
-                    </a:lnB>
-                  </a:tcPr>
-                </a:tc>
-              </a:tr>
-              <a:tr h="92259">
-                <a:tc>
-                  <a:txBody>
-                    <a:bodyPr/>
-                    <a:lstStyle/>
-                    <a:p>
-                      <a:pPr algn="l" fontAlgn="ctr"/>
-                      <a:r>
-                        <a:rPr lang="it-IT" sz="900" b="0" i="0" u="none" strike="noStrike">
-                          <a:solidFill>
-                            <a:srgbClr val="000000"/>
-                          </a:solidFill>
-                          <a:effectLst/>
-                          <a:latin typeface="Lucida Console"/>
-                        </a:rPr>
-                        <a:t>NeighborhoodSWISU   -2.51e-01   5.27e-02   -4.77  2.1e-06 ***</a:t>
-                      </a:r>
-                    </a:p>
-                  </a:txBody>
-                  <a:tcPr marL="3515" marR="3515" marT="2636" marB="0" anchor="ctr">
-                    <a:lnL w="6350" cap="flat" cmpd="sng" algn="ctr">
-                      <a:solidFill>
-                        <a:srgbClr val="000000"/>
-                      </a:solidFill>
-                      <a:prstDash val="solid"/>
-                      <a:round/>
-                      <a:headEnd type="none" w="med" len="med"/>
-                      <a:tailEnd type="none" w="med" len="med"/>
-                    </a:lnL>
-                    <a:lnR w="6350" cap="flat" cmpd="sng" algn="ctr">
-                      <a:solidFill>
-                        <a:srgbClr val="000000"/>
-                      </a:solidFill>
-                      <a:prstDash val="solid"/>
-                      <a:round/>
-                      <a:headEnd type="none" w="med" len="med"/>
-                      <a:tailEnd type="none" w="med" len="med"/>
-                    </a:lnR>
-                    <a:lnT>
-                      <a:noFill/>
-                    </a:lnT>
-                    <a:lnB>
-                      <a:noFill/>
-                    </a:lnB>
-                  </a:tcPr>
-                </a:tc>
-              </a:tr>
-              <a:tr h="92259">
-                <a:tc>
-                  <a:txBody>
-                    <a:bodyPr/>
-                    <a:lstStyle/>
-                    <a:p>
-                      <a:pPr algn="l" fontAlgn="ctr"/>
-                      <a:r>
-                        <a:rPr lang="en-US" sz="900" b="0" i="0" u="none" strike="noStrike" dirty="0">
-                          <a:solidFill>
-                            <a:srgbClr val="000000"/>
-                          </a:solidFill>
-                          <a:effectLst/>
-                          <a:latin typeface="Lucida Console"/>
-                        </a:rPr>
-                        <a:t>NeighborhoodTimber  -3.97e-02   5.44e-02   -0.73  0.46590    </a:t>
-                      </a:r>
-                    </a:p>
-                  </a:txBody>
-                  <a:tcPr marL="3515" marR="3515" marT="2636" marB="0" anchor="ctr">
-                    <a:lnL w="6350" cap="flat" cmpd="sng" algn="ctr">
-                      <a:solidFill>
-                        <a:srgbClr val="000000"/>
-                      </a:solidFill>
-                      <a:prstDash val="solid"/>
-                      <a:round/>
-                      <a:headEnd type="none" w="med" len="med"/>
-                      <a:tailEnd type="none" w="med" len="med"/>
-                    </a:lnL>
-                    <a:lnR w="6350" cap="flat" cmpd="sng" algn="ctr">
-                      <a:solidFill>
-                        <a:srgbClr val="000000"/>
-                      </a:solidFill>
-                      <a:prstDash val="solid"/>
-                      <a:round/>
-                      <a:headEnd type="none" w="med" len="med"/>
-                      <a:tailEnd type="none" w="med" len="med"/>
-                    </a:lnR>
-                    <a:lnT>
-                      <a:noFill/>
-                    </a:lnT>
-                    <a:lnB>
-                      <a:noFill/>
-                    </a:lnB>
-                  </a:tcPr>
-                </a:tc>
-              </a:tr>
-              <a:tr h="92259">
-                <a:tc>
-                  <a:txBody>
-                    <a:bodyPr/>
-                    <a:lstStyle/>
-                    <a:p>
-                      <a:pPr algn="l" fontAlgn="ctr"/>
-                      <a:r>
-                        <a:rPr lang="en-US" sz="900" b="0" i="0" u="none" strike="noStrike" dirty="0">
-                          <a:solidFill>
-                            <a:srgbClr val="000000"/>
-                          </a:solidFill>
-                          <a:effectLst/>
-                          <a:latin typeface="Lucida Console"/>
-                        </a:rPr>
-                        <a:t>NeighborhoodVeenker  2.16e-02   6.08e-02    0.36  0.72266    </a:t>
-                      </a:r>
-                    </a:p>
-                  </a:txBody>
-                  <a:tcPr marL="3515" marR="3515" marT="2636" marB="0" anchor="ctr">
-                    <a:lnL w="6350" cap="flat" cmpd="sng" algn="ctr">
-                      <a:solidFill>
-                        <a:srgbClr val="000000"/>
-                      </a:solidFill>
-                      <a:prstDash val="solid"/>
-                      <a:round/>
-                      <a:headEnd type="none" w="med" len="med"/>
-                      <a:tailEnd type="none" w="med" len="med"/>
-                    </a:lnL>
-                    <a:lnR w="6350" cap="flat" cmpd="sng" algn="ctr">
-                      <a:solidFill>
-                        <a:srgbClr val="000000"/>
-                      </a:solidFill>
-                      <a:prstDash val="solid"/>
-                      <a:round/>
-                      <a:headEnd type="none" w="med" len="med"/>
-                      <a:tailEnd type="none" w="med" len="med"/>
-                    </a:lnR>
-                    <a:lnT>
-                      <a:noFill/>
-                    </a:lnT>
-                    <a:lnB>
-                      <a:noFill/>
-                    </a:lnB>
-                  </a:tcPr>
-                </a:tc>
-              </a:tr>
-              <a:tr h="92259">
-                <a:tc>
-                  <a:txBody>
-                    <a:bodyPr/>
-                    <a:lstStyle/>
-                    <a:p>
-                      <a:pPr algn="l" fontAlgn="ctr"/>
-                      <a:r>
-                        <a:rPr lang="en-US" sz="900" b="0" i="0" u="none" strike="noStrike" dirty="0">
-                          <a:solidFill>
-                            <a:srgbClr val="000000"/>
-                          </a:solidFill>
-                          <a:effectLst/>
-                          <a:latin typeface="Lucida Console"/>
-                        </a:rPr>
-                        <a:t>TotalBsmtSF          1.93e-04   2.43e-05    7.94  6.1e-15 ***</a:t>
-                      </a:r>
-                    </a:p>
-                  </a:txBody>
-                  <a:tcPr marL="3515" marR="3515" marT="2636" marB="0" anchor="ctr">
-                    <a:lnL w="6350" cap="flat" cmpd="sng" algn="ctr">
-                      <a:solidFill>
-                        <a:srgbClr val="000000"/>
-                      </a:solidFill>
-                      <a:prstDash val="solid"/>
-                      <a:round/>
-                      <a:headEnd type="none" w="med" len="med"/>
-                      <a:tailEnd type="none" w="med" len="med"/>
-                    </a:lnL>
-                    <a:lnR w="6350" cap="flat" cmpd="sng" algn="ctr">
-                      <a:solidFill>
-                        <a:srgbClr val="000000"/>
-                      </a:solidFill>
-                      <a:prstDash val="solid"/>
-                      <a:round/>
-                      <a:headEnd type="none" w="med" len="med"/>
-                      <a:tailEnd type="none" w="med" len="med"/>
-                    </a:lnR>
-                    <a:lnT>
-                      <a:noFill/>
-                    </a:lnT>
-                    <a:lnB>
-                      <a:noFill/>
-                    </a:lnB>
-                  </a:tcPr>
-                </a:tc>
-              </a:tr>
-              <a:tr h="92259">
-                <a:tc>
-                  <a:txBody>
-                    <a:bodyPr/>
-                    <a:lstStyle/>
-                    <a:p>
-                      <a:pPr algn="l" fontAlgn="ctr"/>
-                      <a:r>
-                        <a:rPr lang="it-IT" sz="900" b="0" i="0" u="none" strike="noStrike" dirty="0">
-                          <a:solidFill>
-                            <a:srgbClr val="000000"/>
-                          </a:solidFill>
-                          <a:effectLst/>
-                          <a:latin typeface="Lucida Console"/>
-                        </a:rPr>
-                        <a:t>GrLivArea            3.08e-04   1.20e-05   25.64  &lt; 2e-16 ***</a:t>
-                      </a:r>
-                    </a:p>
-                  </a:txBody>
-                  <a:tcPr marL="3515" marR="3515" marT="2636" marB="0" anchor="ctr">
-                    <a:lnL w="6350" cap="flat" cmpd="sng" algn="ctr">
-                      <a:solidFill>
-                        <a:srgbClr val="000000"/>
-                      </a:solidFill>
-                      <a:prstDash val="solid"/>
-                      <a:round/>
-                      <a:headEnd type="none" w="med" len="med"/>
-                      <a:tailEnd type="none" w="med" len="med"/>
-                    </a:lnL>
-                    <a:lnR w="6350" cap="flat" cmpd="sng" algn="ctr">
-                      <a:solidFill>
-                        <a:srgbClr val="000000"/>
-                      </a:solidFill>
-                      <a:prstDash val="solid"/>
-                      <a:round/>
-                      <a:headEnd type="none" w="med" len="med"/>
-                      <a:tailEnd type="none" w="med" len="med"/>
-                    </a:lnR>
-                    <a:lnT>
-                      <a:noFill/>
-                    </a:lnT>
-                    <a:lnB>
-                      <a:noFill/>
-                    </a:lnB>
-                  </a:tcPr>
-                </a:tc>
-              </a:tr>
-              <a:tr h="92259">
-                <a:tc>
-                  <a:txBody>
-                    <a:bodyPr/>
-                    <a:lstStyle/>
-                    <a:p>
-                      <a:pPr algn="l" fontAlgn="ctr"/>
-                      <a:r>
-                        <a:rPr lang="en-US" sz="900" b="0" i="0" u="none" strike="noStrike" dirty="0">
-                          <a:solidFill>
-                            <a:srgbClr val="000000"/>
-                          </a:solidFill>
-                          <a:effectLst/>
-                          <a:latin typeface="Lucida Console"/>
-                        </a:rPr>
-                        <a:t>KitchenQualFa       -2.98e-01   3.53e-02   -8.46  &lt; 2e-16 ***</a:t>
-                      </a:r>
-                    </a:p>
-                  </a:txBody>
-                  <a:tcPr marL="3515" marR="3515" marT="2636" marB="0" anchor="ctr">
-                    <a:lnL w="6350" cap="flat" cmpd="sng" algn="ctr">
-                      <a:solidFill>
-                        <a:srgbClr val="000000"/>
-                      </a:solidFill>
-                      <a:prstDash val="solid"/>
-                      <a:round/>
-                      <a:headEnd type="none" w="med" len="med"/>
-                      <a:tailEnd type="none" w="med" len="med"/>
-                    </a:lnL>
-                    <a:lnR w="6350" cap="flat" cmpd="sng" algn="ctr">
-                      <a:solidFill>
-                        <a:srgbClr val="000000"/>
-                      </a:solidFill>
-                      <a:prstDash val="solid"/>
-                      <a:round/>
-                      <a:headEnd type="none" w="med" len="med"/>
-                      <a:tailEnd type="none" w="med" len="med"/>
-                    </a:lnR>
-                    <a:lnT>
-                      <a:noFill/>
-                    </a:lnT>
-                    <a:lnB>
-                      <a:noFill/>
-                    </a:lnB>
-                  </a:tcPr>
-                </a:tc>
-              </a:tr>
-              <a:tr h="92259">
-                <a:tc>
-                  <a:txBody>
-                    <a:bodyPr/>
-                    <a:lstStyle/>
-                    <a:p>
-                      <a:pPr algn="l" fontAlgn="ctr"/>
-                      <a:r>
-                        <a:rPr lang="en-US" sz="900" b="0" i="0" u="none" strike="noStrike" dirty="0">
-                          <a:solidFill>
-                            <a:srgbClr val="000000"/>
-                          </a:solidFill>
-                          <a:effectLst/>
-                          <a:latin typeface="Lucida Console"/>
-                        </a:rPr>
-                        <a:t>KitchenQualGd       -1.34e-01   2.20e-02   -6.09  1.6e-09 ***</a:t>
-                      </a:r>
-                    </a:p>
-                  </a:txBody>
-                  <a:tcPr marL="3515" marR="3515" marT="2636" marB="0" anchor="ctr">
-                    <a:lnL w="6350" cap="flat" cmpd="sng" algn="ctr">
-                      <a:solidFill>
-                        <a:srgbClr val="000000"/>
-                      </a:solidFill>
-                      <a:prstDash val="solid"/>
-                      <a:round/>
-                      <a:headEnd type="none" w="med" len="med"/>
-                      <a:tailEnd type="none" w="med" len="med"/>
-                    </a:lnL>
-                    <a:lnR w="6350" cap="flat" cmpd="sng" algn="ctr">
-                      <a:solidFill>
-                        <a:srgbClr val="000000"/>
-                      </a:solidFill>
-                      <a:prstDash val="solid"/>
-                      <a:round/>
-                      <a:headEnd type="none" w="med" len="med"/>
-                      <a:tailEnd type="none" w="med" len="med"/>
-                    </a:lnR>
-                    <a:lnT>
-                      <a:noFill/>
-                    </a:lnT>
-                    <a:lnB>
-                      <a:noFill/>
-                    </a:lnB>
-                  </a:tcPr>
-                </a:tc>
-              </a:tr>
-              <a:tr h="92259">
-                <a:tc>
-                  <a:txBody>
-                    <a:bodyPr/>
-                    <a:lstStyle/>
-                    <a:p>
-                      <a:pPr algn="l" fontAlgn="ctr"/>
-                      <a:r>
-                        <a:rPr lang="en-US" sz="900" b="0" i="0" u="none" strike="noStrike" dirty="0">
-                          <a:solidFill>
-                            <a:srgbClr val="000000"/>
-                          </a:solidFill>
-                          <a:effectLst/>
-                          <a:latin typeface="Lucida Console"/>
-                        </a:rPr>
-                        <a:t>KitchenQualTA       -2.11e-01   2.38e-02   -8.88  &lt; 2e-16 ***</a:t>
-                      </a:r>
-                    </a:p>
-                  </a:txBody>
-                  <a:tcPr marL="3515" marR="3515" marT="2636" marB="0" anchor="ctr">
-                    <a:lnL w="6350" cap="flat" cmpd="sng" algn="ctr">
-                      <a:solidFill>
-                        <a:srgbClr val="000000"/>
-                      </a:solidFill>
-                      <a:prstDash val="solid"/>
-                      <a:round/>
-                      <a:headEnd type="none" w="med" len="med"/>
-                      <a:tailEnd type="none" w="med" len="med"/>
-                    </a:lnL>
-                    <a:lnR w="6350" cap="flat" cmpd="sng" algn="ctr">
-                      <a:solidFill>
-                        <a:srgbClr val="000000"/>
-                      </a:solidFill>
-                      <a:prstDash val="solid"/>
-                      <a:round/>
-                      <a:headEnd type="none" w="med" len="med"/>
-                      <a:tailEnd type="none" w="med" len="med"/>
-                    </a:lnR>
-                    <a:lnT>
-                      <a:noFill/>
-                    </a:lnT>
-                    <a:lnB>
-                      <a:noFill/>
-                    </a:lnB>
-                  </a:tcPr>
-                </a:tc>
-              </a:tr>
-              <a:tr h="92259">
-                <a:tc>
-                  <a:txBody>
-                    <a:bodyPr/>
-                    <a:lstStyle/>
-                    <a:p>
-                      <a:pPr algn="l" fontAlgn="ctr"/>
-                      <a:r>
-                        <a:rPr lang="en-US" sz="900" b="0" i="0" u="none" strike="noStrike" dirty="0">
-                          <a:solidFill>
-                            <a:srgbClr val="000000"/>
-                          </a:solidFill>
-                          <a:effectLst/>
-                          <a:latin typeface="Lucida Console"/>
-                        </a:rPr>
-                        <a:t>GarageArea           3.02e-04   2.73e-05   11.04  &lt; 2e-16 ***</a:t>
-                      </a:r>
-                    </a:p>
-                  </a:txBody>
-                  <a:tcPr marL="3515" marR="3515" marT="2636" marB="0" anchor="ctr">
-                    <a:lnL w="6350" cap="flat" cmpd="sng" algn="ctr">
-                      <a:solidFill>
-                        <a:srgbClr val="000000"/>
-                      </a:solidFill>
-                      <a:prstDash val="solid"/>
-                      <a:round/>
-                      <a:headEnd type="none" w="med" len="med"/>
-                      <a:tailEnd type="none" w="med" len="med"/>
-                    </a:lnL>
-                    <a:lnR w="6350" cap="flat" cmpd="sng" algn="ctr">
-                      <a:solidFill>
-                        <a:srgbClr val="000000"/>
-                      </a:solidFill>
-                      <a:prstDash val="solid"/>
-                      <a:round/>
-                      <a:headEnd type="none" w="med" len="med"/>
-                      <a:tailEnd type="none" w="med" len="med"/>
-                    </a:lnR>
-                    <a:lnT>
-                      <a:noFill/>
-                    </a:lnT>
-                    <a:lnB>
-                      <a:noFill/>
-                    </a:lnB>
-                  </a:tcPr>
-                </a:tc>
-              </a:tr>
-              <a:tr h="92259">
-                <a:tc>
-                  <a:txBody>
-                    <a:bodyPr/>
-                    <a:lstStyle/>
-                    <a:p>
-                      <a:pPr algn="l" fontAlgn="ctr"/>
-                      <a:r>
-                        <a:rPr lang="pt-BR" sz="900" b="0" i="0" u="none" strike="noStrike" dirty="0">
-                          <a:solidFill>
-                            <a:srgbClr val="000000"/>
-                          </a:solidFill>
-                          <a:effectLst/>
-                          <a:latin typeface="Lucida Console"/>
-                        </a:rPr>
-                        <a:t>BsmtFinSF1           5.58e-05   1.70e-05    3.28  0.00108 ** </a:t>
-                      </a:r>
-                    </a:p>
-                  </a:txBody>
-                  <a:tcPr marL="3515" marR="3515" marT="2636" marB="0" anchor="ctr">
-                    <a:lnL w="6350" cap="flat" cmpd="sng" algn="ctr">
-                      <a:solidFill>
-                        <a:srgbClr val="000000"/>
-                      </a:solidFill>
-                      <a:prstDash val="solid"/>
-                      <a:round/>
-                      <a:headEnd type="none" w="med" len="med"/>
-                      <a:tailEnd type="none" w="med" len="med"/>
-                    </a:lnL>
-                    <a:lnR w="6350" cap="flat" cmpd="sng" algn="ctr">
-                      <a:solidFill>
-                        <a:srgbClr val="000000"/>
-                      </a:solidFill>
-                      <a:prstDash val="solid"/>
-                      <a:round/>
-                      <a:headEnd type="none" w="med" len="med"/>
-                      <a:tailEnd type="none" w="med" len="med"/>
-                    </a:lnR>
-                    <a:lnT>
-                      <a:noFill/>
-                    </a:lnT>
-                    <a:lnB>
-                      <a:noFill/>
-                    </a:lnB>
-                  </a:tcPr>
-                </a:tc>
-              </a:tr>
-              <a:tr h="92259">
-                <a:tc>
-                  <a:txBody>
-                    <a:bodyPr/>
-                    <a:lstStyle/>
-                    <a:p>
-                      <a:pPr algn="l" fontAlgn="ctr"/>
-                      <a:r>
-                        <a:rPr lang="en-US" sz="900" b="0" i="0" u="none" strike="noStrike" dirty="0">
-                          <a:solidFill>
-                            <a:srgbClr val="000000"/>
-                          </a:solidFill>
-                          <a:effectLst/>
-                          <a:latin typeface="Lucida Console"/>
-                        </a:rPr>
-                        <a:t>BsmtFinType1BLQ     -2.83e-03   1.64e-02   -0.17  0.86338    </a:t>
-                      </a:r>
-                    </a:p>
-                  </a:txBody>
-                  <a:tcPr marL="3515" marR="3515" marT="2636" marB="0" anchor="ctr">
-                    <a:lnL w="6350" cap="flat" cmpd="sng" algn="ctr">
-                      <a:solidFill>
-                        <a:srgbClr val="000000"/>
-                      </a:solidFill>
-                      <a:prstDash val="solid"/>
-                      <a:round/>
-                      <a:headEnd type="none" w="med" len="med"/>
-                      <a:tailEnd type="none" w="med" len="med"/>
-                    </a:lnL>
-                    <a:lnR w="6350" cap="flat" cmpd="sng" algn="ctr">
-                      <a:solidFill>
-                        <a:srgbClr val="000000"/>
-                      </a:solidFill>
-                      <a:prstDash val="solid"/>
-                      <a:round/>
-                      <a:headEnd type="none" w="med" len="med"/>
-                      <a:tailEnd type="none" w="med" len="med"/>
-                    </a:lnR>
-                    <a:lnT>
-                      <a:noFill/>
-                    </a:lnT>
-                    <a:lnB>
-                      <a:noFill/>
-                    </a:lnB>
-                  </a:tcPr>
-                </a:tc>
-              </a:tr>
-              <a:tr h="92259">
-                <a:tc>
-                  <a:txBody>
-                    <a:bodyPr/>
-                    <a:lstStyle/>
-                    <a:p>
-                      <a:pPr algn="l" fontAlgn="ctr"/>
-                      <a:r>
-                        <a:rPr lang="en-US" sz="900" b="0" i="0" u="none" strike="noStrike" dirty="0">
-                          <a:solidFill>
-                            <a:srgbClr val="000000"/>
-                          </a:solidFill>
-                          <a:effectLst/>
-                          <a:latin typeface="Lucida Console"/>
-                        </a:rPr>
-                        <a:t>BsmtFinType1GLQ      4.30e-02   1.47e-02    2.94  0.00341 ** </a:t>
-                      </a:r>
-                    </a:p>
-                  </a:txBody>
-                  <a:tcPr marL="3515" marR="3515" marT="2636" marB="0" anchor="ctr">
-                    <a:lnL w="6350" cap="flat" cmpd="sng" algn="ctr">
-                      <a:solidFill>
-                        <a:srgbClr val="000000"/>
-                      </a:solidFill>
-                      <a:prstDash val="solid"/>
-                      <a:round/>
-                      <a:headEnd type="none" w="med" len="med"/>
-                      <a:tailEnd type="none" w="med" len="med"/>
-                    </a:lnL>
-                    <a:lnR w="6350" cap="flat" cmpd="sng" algn="ctr">
-                      <a:solidFill>
-                        <a:srgbClr val="000000"/>
-                      </a:solidFill>
-                      <a:prstDash val="solid"/>
-                      <a:round/>
-                      <a:headEnd type="none" w="med" len="med"/>
-                      <a:tailEnd type="none" w="med" len="med"/>
-                    </a:lnR>
-                    <a:lnT>
-                      <a:noFill/>
-                    </a:lnT>
-                    <a:lnB>
-                      <a:noFill/>
-                    </a:lnB>
-                  </a:tcPr>
-                </a:tc>
-              </a:tr>
-              <a:tr h="92259">
-                <a:tc>
-                  <a:txBody>
-                    <a:bodyPr/>
-                    <a:lstStyle/>
-                    <a:p>
-                      <a:pPr algn="l" fontAlgn="ctr"/>
-                      <a:r>
-                        <a:rPr lang="en-US" sz="900" b="0" i="0" u="none" strike="noStrike" dirty="0">
-                          <a:solidFill>
-                            <a:srgbClr val="000000"/>
-                          </a:solidFill>
-                          <a:effectLst/>
-                          <a:latin typeface="Lucida Console"/>
-                        </a:rPr>
-                        <a:t>BsmtFinType1LwQ     -2.49e-02   2.13e-02   -1.17  0.24250    </a:t>
-                      </a:r>
-                    </a:p>
-                  </a:txBody>
-                  <a:tcPr marL="3515" marR="3515" marT="2636" marB="0" anchor="ctr">
-                    <a:lnL w="6350" cap="flat" cmpd="sng" algn="ctr">
-                      <a:solidFill>
-                        <a:srgbClr val="000000"/>
-                      </a:solidFill>
-                      <a:prstDash val="solid"/>
-                      <a:round/>
-                      <a:headEnd type="none" w="med" len="med"/>
-                      <a:tailEnd type="none" w="med" len="med"/>
-                    </a:lnL>
-                    <a:lnR w="6350" cap="flat" cmpd="sng" algn="ctr">
-                      <a:solidFill>
-                        <a:srgbClr val="000000"/>
-                      </a:solidFill>
-                      <a:prstDash val="solid"/>
-                      <a:round/>
-                      <a:headEnd type="none" w="med" len="med"/>
-                      <a:tailEnd type="none" w="med" len="med"/>
-                    </a:lnR>
-                    <a:lnT>
-                      <a:noFill/>
-                    </a:lnT>
-                    <a:lnB>
-                      <a:noFill/>
-                    </a:lnB>
-                  </a:tcPr>
-                </a:tc>
-              </a:tr>
-              <a:tr h="92259">
-                <a:tc>
-                  <a:txBody>
-                    <a:bodyPr/>
-                    <a:lstStyle/>
-                    <a:p>
-                      <a:pPr algn="l" fontAlgn="ctr"/>
-                      <a:r>
-                        <a:rPr lang="en-US" sz="900" b="0" i="0" u="none" strike="noStrike" dirty="0">
-                          <a:solidFill>
-                            <a:srgbClr val="000000"/>
-                          </a:solidFill>
-                          <a:effectLst/>
-                          <a:latin typeface="Lucida Console"/>
-                        </a:rPr>
-                        <a:t>BsmtFinType1NB      -1.38e-02   3.79e-02   -0.37  0.71505    </a:t>
-                      </a:r>
-                    </a:p>
-                  </a:txBody>
-                  <a:tcPr marL="3515" marR="3515" marT="2636" marB="0" anchor="ctr">
-                    <a:lnL w="6350" cap="flat" cmpd="sng" algn="ctr">
-                      <a:solidFill>
-                        <a:srgbClr val="000000"/>
-                      </a:solidFill>
-                      <a:prstDash val="solid"/>
-                      <a:round/>
-                      <a:headEnd type="none" w="med" len="med"/>
-                      <a:tailEnd type="none" w="med" len="med"/>
-                    </a:lnL>
-                    <a:lnR w="6350" cap="flat" cmpd="sng" algn="ctr">
-                      <a:solidFill>
-                        <a:srgbClr val="000000"/>
-                      </a:solidFill>
-                      <a:prstDash val="solid"/>
-                      <a:round/>
-                      <a:headEnd type="none" w="med" len="med"/>
-                      <a:tailEnd type="none" w="med" len="med"/>
-                    </a:lnR>
-                    <a:lnT>
-                      <a:noFill/>
-                    </a:lnT>
-                    <a:lnB>
-                      <a:noFill/>
-                    </a:lnB>
-                  </a:tcPr>
-                </a:tc>
-              </a:tr>
-              <a:tr h="92259">
-                <a:tc>
-                  <a:txBody>
-                    <a:bodyPr/>
-                    <a:lstStyle/>
-                    <a:p>
-                      <a:pPr algn="l" fontAlgn="ctr"/>
-                      <a:r>
-                        <a:rPr lang="en-US" sz="900" b="0" i="0" u="none" strike="noStrike" dirty="0">
-                          <a:solidFill>
-                            <a:srgbClr val="000000"/>
-                          </a:solidFill>
-                          <a:effectLst/>
-                          <a:latin typeface="Lucida Console"/>
-                        </a:rPr>
-                        <a:t>BsmtFinType1Rec     -2.76e-02   1.71e-02   -1.61  0.10823    </a:t>
-                      </a:r>
-                    </a:p>
-                  </a:txBody>
-                  <a:tcPr marL="3515" marR="3515" marT="2636" marB="0" anchor="ctr">
-                    <a:lnL w="6350" cap="flat" cmpd="sng" algn="ctr">
-                      <a:solidFill>
-                        <a:srgbClr val="000000"/>
-                      </a:solidFill>
-                      <a:prstDash val="solid"/>
-                      <a:round/>
-                      <a:headEnd type="none" w="med" len="med"/>
-                      <a:tailEnd type="none" w="med" len="med"/>
-                    </a:lnL>
-                    <a:lnR w="6350" cap="flat" cmpd="sng" algn="ctr">
-                      <a:solidFill>
-                        <a:srgbClr val="000000"/>
-                      </a:solidFill>
-                      <a:prstDash val="solid"/>
-                      <a:round/>
-                      <a:headEnd type="none" w="med" len="med"/>
-                      <a:tailEnd type="none" w="med" len="med"/>
-                    </a:lnR>
-                    <a:lnT>
-                      <a:noFill/>
-                    </a:lnT>
-                    <a:lnB>
-                      <a:noFill/>
-                    </a:lnB>
-                  </a:tcPr>
-                </a:tc>
-              </a:tr>
-              <a:tr h="92259">
-                <a:tc>
-                  <a:txBody>
-                    <a:bodyPr/>
-                    <a:lstStyle/>
-                    <a:p>
-                      <a:pPr algn="l" fontAlgn="ctr"/>
-                      <a:r>
-                        <a:rPr lang="it-IT" sz="900" b="0" i="0" u="none" strike="noStrike">
-                          <a:solidFill>
-                            <a:srgbClr val="000000"/>
-                          </a:solidFill>
-                          <a:effectLst/>
-                          <a:latin typeface="Lucida Console"/>
-                        </a:rPr>
-                        <a:t>BsmtFinType1Unf     -2.14e-02   1.75e-02   -1.23  0.21997    </a:t>
-                      </a:r>
-                    </a:p>
-                  </a:txBody>
-                  <a:tcPr marL="3515" marR="3515" marT="2636" marB="0" anchor="ctr">
-                    <a:lnL w="6350" cap="flat" cmpd="sng" algn="ctr">
-                      <a:solidFill>
-                        <a:srgbClr val="000000"/>
-                      </a:solidFill>
-                      <a:prstDash val="solid"/>
-                      <a:round/>
-                      <a:headEnd type="none" w="med" len="med"/>
-                      <a:tailEnd type="none" w="med" len="med"/>
-                    </a:lnL>
-                    <a:lnR w="6350" cap="flat" cmpd="sng" algn="ctr">
-                      <a:solidFill>
-                        <a:srgbClr val="000000"/>
-                      </a:solidFill>
-                      <a:prstDash val="solid"/>
-                      <a:round/>
-                      <a:headEnd type="none" w="med" len="med"/>
-                      <a:tailEnd type="none" w="med" len="med"/>
-                    </a:lnR>
-                    <a:lnT>
-                      <a:noFill/>
-                    </a:lnT>
-                    <a:lnB>
-                      <a:noFill/>
-                    </a:lnB>
-                  </a:tcPr>
-                </a:tc>
-              </a:tr>
-              <a:tr h="92259">
-                <a:tc>
-                  <a:txBody>
-                    <a:bodyPr/>
-                    <a:lstStyle/>
-                    <a:p>
-                      <a:pPr algn="l" fontAlgn="ctr"/>
-                      <a:r>
-                        <a:rPr lang="it-IT" sz="900" b="0" i="0" u="none" strike="noStrike">
-                          <a:solidFill>
-                            <a:srgbClr val="000000"/>
-                          </a:solidFill>
-                          <a:effectLst/>
-                          <a:latin typeface="Lucida Console"/>
-                        </a:rPr>
-                        <a:t>OverallCond          5.47e-02   4.22e-03   12.96  &lt; 2e-16 ***</a:t>
-                      </a:r>
-                    </a:p>
-                  </a:txBody>
-                  <a:tcPr marL="3515" marR="3515" marT="2636" marB="0" anchor="ctr">
-                    <a:lnL w="6350" cap="flat" cmpd="sng" algn="ctr">
-                      <a:solidFill>
-                        <a:srgbClr val="000000"/>
-                      </a:solidFill>
-                      <a:prstDash val="solid"/>
-                      <a:round/>
-                      <a:headEnd type="none" w="med" len="med"/>
-                      <a:tailEnd type="none" w="med" len="med"/>
-                    </a:lnL>
-                    <a:lnR w="6350" cap="flat" cmpd="sng" algn="ctr">
-                      <a:solidFill>
-                        <a:srgbClr val="000000"/>
-                      </a:solidFill>
-                      <a:prstDash val="solid"/>
-                      <a:round/>
-                      <a:headEnd type="none" w="med" len="med"/>
-                      <a:tailEnd type="none" w="med" len="med"/>
-                    </a:lnR>
-                    <a:lnT>
-                      <a:noFill/>
-                    </a:lnT>
-                    <a:lnB>
-                      <a:noFill/>
-                    </a:lnB>
-                  </a:tcPr>
-                </a:tc>
-              </a:tr>
-              <a:tr h="92259">
-                <a:tc>
-                  <a:txBody>
-                    <a:bodyPr/>
-                    <a:lstStyle/>
-                    <a:p>
-                      <a:pPr algn="l" fontAlgn="ctr"/>
-                      <a:r>
-                        <a:rPr lang="en-US" sz="900" b="0" i="0" u="none" strike="noStrike" dirty="0">
-                          <a:solidFill>
-                            <a:srgbClr val="000000"/>
-                          </a:solidFill>
-                          <a:effectLst/>
-                          <a:latin typeface="Lucida Console"/>
-                        </a:rPr>
-                        <a:t>LotArea              1.79e-06   4.12e-07    4.34  1.6e-05 ***</a:t>
-                      </a:r>
-                    </a:p>
-                  </a:txBody>
-                  <a:tcPr marL="3515" marR="3515" marT="2636" marB="0" anchor="ctr">
-                    <a:lnL w="6350" cap="flat" cmpd="sng" algn="ctr">
-                      <a:solidFill>
-                        <a:srgbClr val="000000"/>
-                      </a:solidFill>
-                      <a:prstDash val="solid"/>
-                      <a:round/>
-                      <a:headEnd type="none" w="med" len="med"/>
-                      <a:tailEnd type="none" w="med" len="med"/>
-                    </a:lnL>
-                    <a:lnR w="6350" cap="flat" cmpd="sng" algn="ctr">
-                      <a:solidFill>
-                        <a:srgbClr val="000000"/>
-                      </a:solidFill>
-                      <a:prstDash val="solid"/>
-                      <a:round/>
-                      <a:headEnd type="none" w="med" len="med"/>
-                      <a:tailEnd type="none" w="med" len="med"/>
-                    </a:lnR>
-                    <a:lnT>
-                      <a:noFill/>
-                    </a:lnT>
-                    <a:lnB>
-                      <a:noFill/>
-                    </a:lnB>
-                  </a:tcPr>
-                </a:tc>
-              </a:tr>
-              <a:tr h="92259">
-                <a:tc>
-                  <a:txBody>
-                    <a:bodyPr/>
-                    <a:lstStyle/>
-                    <a:p>
-                      <a:pPr algn="l" fontAlgn="ctr"/>
-                      <a:r>
-                        <a:rPr lang="en-US" sz="900" b="0" i="0" u="none" strike="noStrike" dirty="0">
-                          <a:solidFill>
-                            <a:srgbClr val="000000"/>
-                          </a:solidFill>
-                          <a:effectLst/>
-                          <a:latin typeface="Lucida Console"/>
-                        </a:rPr>
-                        <a:t>X1stFlrSF           -3.97e-05   2.59e-05   -1.53  0.12561    </a:t>
-                      </a:r>
-                    </a:p>
-                  </a:txBody>
-                  <a:tcPr marL="3515" marR="3515" marT="2636" marB="0" anchor="ctr">
-                    <a:lnL w="6350" cap="flat" cmpd="sng" algn="ctr">
-                      <a:solidFill>
-                        <a:srgbClr val="000000"/>
-                      </a:solidFill>
-                      <a:prstDash val="solid"/>
-                      <a:round/>
-                      <a:headEnd type="none" w="med" len="med"/>
-                      <a:tailEnd type="none" w="med" len="med"/>
-                    </a:lnL>
-                    <a:lnR w="6350" cap="flat" cmpd="sng" algn="ctr">
-                      <a:solidFill>
-                        <a:srgbClr val="000000"/>
-                      </a:solidFill>
-                      <a:prstDash val="solid"/>
-                      <a:round/>
-                      <a:headEnd type="none" w="med" len="med"/>
-                      <a:tailEnd type="none" w="med" len="med"/>
-                    </a:lnR>
-                    <a:lnT>
-                      <a:noFill/>
-                    </a:lnT>
-                    <a:lnB>
-                      <a:noFill/>
-                    </a:lnB>
-                  </a:tcPr>
-                </a:tc>
-              </a:tr>
-              <a:tr h="92259">
-                <a:tc>
-                  <a:txBody>
-                    <a:bodyPr/>
-                    <a:lstStyle/>
-                    <a:p>
-                      <a:pPr algn="l" fontAlgn="ctr"/>
-                      <a:r>
-                        <a:rPr lang="en-US" sz="900" b="0" i="0" u="none" strike="noStrike" dirty="0">
-                          <a:solidFill>
-                            <a:srgbClr val="000000"/>
-                          </a:solidFill>
-                          <a:effectLst/>
-                          <a:latin typeface="Lucida Console"/>
-                        </a:rPr>
-                        <a:t>---</a:t>
-                      </a:r>
-                    </a:p>
-                  </a:txBody>
-                  <a:tcPr marL="3515" marR="3515" marT="2636" marB="0" anchor="ctr">
-                    <a:lnL w="6350" cap="flat" cmpd="sng" algn="ctr">
-                      <a:solidFill>
-                        <a:srgbClr val="000000"/>
-                      </a:solidFill>
-                      <a:prstDash val="solid"/>
-                      <a:round/>
-                      <a:headEnd type="none" w="med" len="med"/>
-                      <a:tailEnd type="none" w="med" len="med"/>
-                    </a:lnL>
-                    <a:lnR w="6350" cap="flat" cmpd="sng" algn="ctr">
-                      <a:solidFill>
-                        <a:srgbClr val="000000"/>
-                      </a:solidFill>
-                      <a:prstDash val="solid"/>
-                      <a:round/>
-                      <a:headEnd type="none" w="med" len="med"/>
-                      <a:tailEnd type="none" w="med" len="med"/>
-                    </a:lnR>
-                    <a:lnT>
-                      <a:noFill/>
-                    </a:lnT>
-                    <a:lnB>
-                      <a:noFill/>
-                    </a:lnB>
-                  </a:tcPr>
-                </a:tc>
-              </a:tr>
-              <a:tr h="92259">
-                <a:tc>
-                  <a:txBody>
-                    <a:bodyPr/>
-                    <a:lstStyle/>
-                    <a:p>
-                      <a:pPr algn="l" fontAlgn="ctr"/>
-                      <a:r>
-                        <a:rPr lang="fr-FR" sz="900" b="0" i="0" u="none" strike="noStrike" dirty="0">
-                          <a:solidFill>
-                            <a:srgbClr val="000000"/>
-                          </a:solidFill>
-                          <a:effectLst/>
-                          <a:latin typeface="Lucida Console"/>
-                        </a:rPr>
-                        <a:t>Signif. codes:  0 ‘***’ 0.001 ‘**’ 0.01 ‘*’ 0.05 ‘.’ 0.1 ‘ ’ 1</a:t>
-                      </a:r>
-                    </a:p>
-                  </a:txBody>
-                  <a:tcPr marL="3515" marR="3515" marT="2636" marB="0" anchor="ctr">
-                    <a:lnL w="6350" cap="flat" cmpd="sng" algn="ctr">
-                      <a:solidFill>
-                        <a:srgbClr val="000000"/>
-                      </a:solidFill>
-                      <a:prstDash val="solid"/>
-                      <a:round/>
-                      <a:headEnd type="none" w="med" len="med"/>
-                      <a:tailEnd type="none" w="med" len="med"/>
-                    </a:lnL>
-                    <a:lnR w="6350" cap="flat" cmpd="sng" algn="ctr">
-                      <a:solidFill>
-                        <a:srgbClr val="000000"/>
-                      </a:solidFill>
-                      <a:prstDash val="solid"/>
-                      <a:round/>
-                      <a:headEnd type="none" w="med" len="med"/>
-                      <a:tailEnd type="none" w="med" len="med"/>
-                    </a:lnR>
-                    <a:lnT>
-                      <a:noFill/>
-                    </a:lnT>
-                    <a:lnB>
-                      <a:noFill/>
-                    </a:lnB>
-                  </a:tcPr>
-                </a:tc>
-              </a:tr>
-              <a:tr h="97531">
-                <a:tc>
-                  <a:txBody>
-                    <a:bodyPr/>
-                    <a:lstStyle/>
-                    <a:p>
-                      <a:pPr algn="l" fontAlgn="ctr"/>
-                      <a:r>
-                        <a:rPr lang="en-US" sz="900" b="0" i="0" u="none" strike="noStrike" dirty="0">
-                          <a:solidFill>
-                            <a:srgbClr val="000000"/>
-                          </a:solidFill>
-                          <a:effectLst/>
-                          <a:latin typeface="Calibri"/>
-                        </a:rPr>
-                        <a:t> </a:t>
-                      </a:r>
-                    </a:p>
-                  </a:txBody>
-                  <a:tcPr marL="3515" marR="3515" marT="2636" marB="0" anchor="ctr">
-                    <a:lnL w="6350" cap="flat" cmpd="sng" algn="ctr">
-                      <a:solidFill>
-                        <a:srgbClr val="000000"/>
-                      </a:solidFill>
-                      <a:prstDash val="solid"/>
-                      <a:round/>
-                      <a:headEnd type="none" w="med" len="med"/>
-                      <a:tailEnd type="none" w="med" len="med"/>
-                    </a:lnL>
-                    <a:lnR w="6350" cap="flat" cmpd="sng" algn="ctr">
-                      <a:solidFill>
-                        <a:srgbClr val="000000"/>
-                      </a:solidFill>
-                      <a:prstDash val="solid"/>
-                      <a:round/>
-                      <a:headEnd type="none" w="med" len="med"/>
-                      <a:tailEnd type="none" w="med" len="med"/>
-                    </a:lnR>
-                    <a:lnT>
-                      <a:noFill/>
-                    </a:lnT>
-                    <a:lnB>
-                      <a:noFill/>
-                    </a:lnB>
-                  </a:tcPr>
-                </a:tc>
-              </a:tr>
-              <a:tr h="92259">
-                <a:tc>
-                  <a:txBody>
-                    <a:bodyPr/>
-                    <a:lstStyle/>
-                    <a:p>
-                      <a:pPr algn="l" fontAlgn="ctr"/>
-                      <a:r>
-                        <a:rPr lang="en-US" sz="900" b="0" i="0" u="none" strike="noStrike" dirty="0">
-                          <a:solidFill>
-                            <a:srgbClr val="000000"/>
-                          </a:solidFill>
-                          <a:effectLst/>
-                          <a:latin typeface="Lucida Console"/>
-                        </a:rPr>
-                        <a:t>Residual standard error: 0.125 on 916 degrees of freedom</a:t>
-                      </a:r>
-                    </a:p>
-                  </a:txBody>
-                  <a:tcPr marL="3515" marR="3515" marT="2636" marB="0" anchor="ctr">
-                    <a:lnL w="6350" cap="flat" cmpd="sng" algn="ctr">
-                      <a:solidFill>
-                        <a:srgbClr val="000000"/>
-                      </a:solidFill>
-                      <a:prstDash val="solid"/>
-                      <a:round/>
-                      <a:headEnd type="none" w="med" len="med"/>
-                      <a:tailEnd type="none" w="med" len="med"/>
-                    </a:lnL>
-                    <a:lnR w="6350" cap="flat" cmpd="sng" algn="ctr">
-                      <a:solidFill>
-                        <a:srgbClr val="000000"/>
-                      </a:solidFill>
-                      <a:prstDash val="solid"/>
-                      <a:round/>
-                      <a:headEnd type="none" w="med" len="med"/>
-                      <a:tailEnd type="none" w="med" len="med"/>
-                    </a:lnR>
-                    <a:lnT>
-                      <a:noFill/>
-                    </a:lnT>
-                    <a:lnB>
-                      <a:noFill/>
-                    </a:lnB>
-                  </a:tcPr>
-                </a:tc>
-              </a:tr>
-              <a:tr h="92259">
-                <a:tc>
-                  <a:txBody>
-                    <a:bodyPr/>
-                    <a:lstStyle/>
-                    <a:p>
-                      <a:pPr algn="l" fontAlgn="ctr"/>
-                      <a:r>
-                        <a:rPr lang="en-US" sz="900" b="0" i="0" u="none" strike="noStrike" dirty="0">
-                          <a:solidFill>
-                            <a:srgbClr val="000000"/>
-                          </a:solidFill>
-                          <a:effectLst/>
-                          <a:latin typeface="Lucida Console"/>
-                        </a:rPr>
-                        <a:t>Multiple R-squared:  0.887,     Adjusted R-squared:  0.882 </a:t>
-                      </a:r>
-                    </a:p>
-                  </a:txBody>
-                  <a:tcPr marL="3515" marR="3515" marT="2636" marB="0" anchor="ctr">
-                    <a:lnL w="6350" cap="flat" cmpd="sng" algn="ctr">
-                      <a:solidFill>
-                        <a:srgbClr val="000000"/>
-                      </a:solidFill>
-                      <a:prstDash val="solid"/>
-                      <a:round/>
-                      <a:headEnd type="none" w="med" len="med"/>
-                      <a:tailEnd type="none" w="med" len="med"/>
-                    </a:lnL>
-                    <a:lnR w="6350" cap="flat" cmpd="sng" algn="ctr">
-                      <a:solidFill>
-                        <a:srgbClr val="000000"/>
-                      </a:solidFill>
-                      <a:prstDash val="solid"/>
-                      <a:round/>
-                      <a:headEnd type="none" w="med" len="med"/>
-                      <a:tailEnd type="none" w="med" len="med"/>
-                    </a:lnR>
-                    <a:lnT>
-                      <a:noFill/>
-                    </a:lnT>
-                    <a:lnB>
-                      <a:noFill/>
-                    </a:lnB>
-                  </a:tcPr>
-                </a:tc>
-              </a:tr>
-              <a:tr h="92259">
-                <a:tc>
-                  <a:txBody>
-                    <a:bodyPr/>
-                    <a:lstStyle/>
-                    <a:p>
-                      <a:pPr algn="l" fontAlgn="ctr"/>
-                      <a:r>
-                        <a:rPr lang="en-US" sz="900" b="0" i="0" u="none" strike="noStrike" dirty="0">
-                          <a:solidFill>
-                            <a:srgbClr val="000000"/>
-                          </a:solidFill>
-                          <a:effectLst/>
-                          <a:latin typeface="Lucida Console"/>
-                        </a:rPr>
-                        <a:t>F-statistic:  180 on 40 and 916 DF,  p-value: &lt;2e-16</a:t>
-                      </a:r>
-                    </a:p>
-                  </a:txBody>
-                  <a:tcPr marL="3515" marR="3515" marT="2636" marB="0" anchor="ctr">
-                    <a:lnL w="6350" cap="flat" cmpd="sng" algn="ctr">
-                      <a:solidFill>
-                        <a:srgbClr val="000000"/>
-                      </a:solidFill>
-                      <a:prstDash val="solid"/>
-                      <a:round/>
-                      <a:headEnd type="none" w="med" len="med"/>
-                      <a:tailEnd type="none" w="med" len="med"/>
-                    </a:lnL>
-                    <a:lnR w="6350" cap="flat" cmpd="sng" algn="ctr">
-                      <a:solidFill>
-                        <a:srgbClr val="000000"/>
-                      </a:solidFill>
-                      <a:prstDash val="solid"/>
-                      <a:round/>
-                      <a:headEnd type="none" w="med" len="med"/>
-                      <a:tailEnd type="none" w="med" len="med"/>
-                    </a:lnR>
-                    <a:lnT>
-                      <a:noFill/>
-                    </a:lnT>
-                    <a:lnB w="6350" cap="flat" cmpd="sng" algn="ctr">
-                      <a:solidFill>
-                        <a:srgbClr val="000000"/>
-                      </a:solidFill>
-                      <a:prstDash val="solid"/>
-                      <a:round/>
-                      <a:headEnd type="none" w="med" len="med"/>
-                      <a:tailEnd type="none" w="med" len="med"/>
-                    </a:lnB>
-                  </a:tcPr>
-                </a:tc>
-              </a:tr>
-            </a:tbl>
-          </a:graphicData>
-        </a:graphic>
-      </p:graphicFrame>
+      <p:pic>
+        <p:nvPicPr>
+          <p:cNvPr id="1026" name="Picture 2"/>
+          <p:cNvPicPr>
+            <a:picLocks noChangeAspect="1" noChangeArrowheads="1"/>
+          </p:cNvPicPr>
+          <p:nvPr/>
+        </p:nvPicPr>
+        <p:blipFill>
+          <a:blip r:embed="rId2">
+            <a:extLst>
+              <a:ext uri="{28A0092B-C50C-407E-A947-70E740481C1C}">
+                <a14:useLocalDpi xmlns:a14="http://schemas.microsoft.com/office/drawing/2010/main" val="0"/>
+              </a:ext>
+            </a:extLst>
+          </a:blip>
+          <a:srcRect/>
+          <a:stretch>
+            <a:fillRect/>
+          </a:stretch>
+        </p:blipFill>
+        <p:spPr bwMode="auto">
+          <a:xfrm>
+            <a:off x="3851910" y="0"/>
+            <a:ext cx="5067300" cy="6802120"/>
+          </a:xfrm>
+          <a:prstGeom prst="rect">
+            <a:avLst/>
+          </a:prstGeom>
+          <a:noFill/>
+          <a:ln>
+            <a:noFill/>
+          </a:ln>
+          <a:extLst>
+            <a:ext uri="{909E8E84-426E-40DD-AFC4-6F175D3DCCD1}">
+              <a14:hiddenFill xmlns:a14="http://schemas.microsoft.com/office/drawing/2010/main">
+                <a:solidFill>
+                  <a:schemeClr val="accent1"/>
+                </a:solidFill>
+              </a14:hiddenFill>
+            </a:ext>
+            <a:ext uri="{91240B29-F687-4F45-9708-019B960494DF}">
+              <a14:hiddenLine xmlns:a14="http://schemas.microsoft.com/office/drawing/2010/main" w="9525">
+                <a:solidFill>
+                  <a:schemeClr val="tx1"/>
+                </a:solidFill>
+                <a:miter lim="800000"/>
+                <a:headEnd/>
+                <a:tailEnd/>
+              </a14:hiddenLine>
+            </a:ext>
+          </a:extLst>
+        </p:spPr>
+      </p:pic>
     </p:spTree>
     <p:extLst>
       <p:ext uri="{BB962C8B-B14F-4D97-AF65-F5344CB8AC3E}">
-        <p14:creationId xmlns:p14="http://schemas.microsoft.com/office/powerpoint/2010/main" val="2113545856"/>
+        <p14:creationId xmlns:p14="http://schemas.microsoft.com/office/powerpoint/2010/main" val="183550894"/>
       </p:ext>
     </p:extLst>
   </p:cSld>
@@ -9586,7 +7279,7 @@
   <p:timing>
     <p:tnLst>
       <p:par>
-        <p:cTn xmlns:p14="http://schemas.microsoft.com/office/powerpoint/2010/main" id="1" dur="indefinite" restart="never" nodeType="tmRoot"/>
+        <p:cTn id="1" dur="indefinite" restart="never" nodeType="tmRoot"/>
       </p:par>
     </p:tnLst>
   </p:timing>
@@ -9622,8 +7315,8 @@
         </p:nvSpPr>
         <p:spPr>
           <a:xfrm>
-            <a:off x="2104887" y="2431774"/>
-            <a:ext cx="6400800" cy="825500"/>
+            <a:off x="3652519" y="3046454"/>
+            <a:ext cx="5198607" cy="825500"/>
           </a:xfrm>
         </p:spPr>
         <p:txBody>
@@ -9688,7 +7381,7 @@
   <p:timing>
     <p:tnLst>
       <p:par>
-        <p:cTn xmlns:p14="http://schemas.microsoft.com/office/powerpoint/2010/main" id="1" dur="indefinite" restart="never" nodeType="tmRoot"/>
+        <p:cTn id="1" dur="indefinite" restart="never" nodeType="tmRoot"/>
       </p:par>
     </p:tnLst>
   </p:timing>
@@ -9785,7 +7478,7 @@
   <p:timing>
     <p:tnLst>
       <p:par>
-        <p:cTn xmlns:p14="http://schemas.microsoft.com/office/powerpoint/2010/main" id="1" dur="indefinite" restart="never" nodeType="tmRoot"/>
+        <p:cTn id="1" dur="indefinite" restart="never" nodeType="tmRoot"/>
       </p:par>
     </p:tnLst>
   </p:timing>
@@ -9885,7 +7578,7 @@
   <p:timing>
     <p:tnLst>
       <p:par>
-        <p:cTn xmlns:p14="http://schemas.microsoft.com/office/powerpoint/2010/main" id="1" dur="indefinite" restart="never" nodeType="tmRoot"/>
+        <p:cTn id="1" dur="indefinite" restart="never" nodeType="tmRoot"/>
       </p:par>
     </p:tnLst>
   </p:timing>
@@ -9985,7 +7678,7 @@
   <p:timing>
     <p:tnLst>
       <p:par>
-        <p:cTn xmlns:p14="http://schemas.microsoft.com/office/powerpoint/2010/main" id="1" dur="indefinite" restart="never" nodeType="tmRoot"/>
+        <p:cTn id="1" dur="indefinite" restart="never" nodeType="tmRoot"/>
       </p:par>
     </p:tnLst>
   </p:timing>
@@ -10150,7 +7843,7 @@
   <p:timing>
     <p:tnLst>
       <p:par>
-        <p:cTn xmlns:p14="http://schemas.microsoft.com/office/powerpoint/2010/main" id="1" dur="indefinite" restart="never" nodeType="tmRoot"/>
+        <p:cTn id="1" dur="indefinite" restart="never" nodeType="tmRoot"/>
       </p:par>
     </p:tnLst>
   </p:timing>
@@ -10237,7 +7930,7 @@
   <p:timing>
     <p:tnLst>
       <p:par>
-        <p:cTn xmlns:p14="http://schemas.microsoft.com/office/powerpoint/2010/main" id="1" dur="indefinite" restart="never" nodeType="tmRoot"/>
+        <p:cTn id="1" dur="indefinite" restart="never" nodeType="tmRoot"/>
       </p:par>
     </p:tnLst>
   </p:timing>
@@ -10345,7 +8038,7 @@
   <p:timing>
     <p:tnLst>
       <p:par>
-        <p:cTn xmlns:p14="http://schemas.microsoft.com/office/powerpoint/2010/main" id="1" dur="indefinite" restart="never" nodeType="tmRoot"/>
+        <p:cTn id="1" dur="indefinite" restart="never" nodeType="tmRoot"/>
       </p:par>
     </p:tnLst>
   </p:timing>

</xml_diff>